<commit_message>
FY23Q2 refresh - msteams-conversation-bots
- run through all exercise steps in associated MSLearn module to validate good working order
- updated steps & fixed typos where necessary
- updated slides where necessary
- update code samples to reflect MSLearn HOL exercise refresh & updates
- any & all users/names/company names/pictures/IDs are not real people/tenants... all are from M365 demo tenants provided by Microsoft
</commit_message>
<xml_diff>
--- a/Teams/40 Conversational Bots/slides.pptx
+++ b/Teams/40 Conversational Bots/slides.pptx
@@ -308,7 +308,7 @@
           <a:p>
             <a:fld id="{F5D67128-0ED3-F84C-AB75-26956BD6F773}" type="datetimeFigureOut">
               <a:rPr lang="en-US" smtClean="0"/>
-              <a:t>5/26/21</a:t>
+              <a:t>12/2/22</a:t>
             </a:fld>
             <a:endParaRPr lang="en-US"/>
           </a:p>
@@ -485,7 +485,7 @@
           <a:p>
             <a:fld id="{9E65F564-29A8-0243-B41B-CCCF740F82F1}" type="datetimeFigureOut">
               <a:rPr lang="en-US" smtClean="0"/>
-              <a:t>5/26/21</a:t>
+              <a:t>12/2/22</a:t>
             </a:fld>
             <a:endParaRPr lang="en-US"/>
           </a:p>
@@ -7455,7 +7455,7 @@
         <p:spPr/>
         <p:txBody>
           <a:bodyPr>
-            <a:normAutofit fontScale="40000" lnSpcReduction="20000"/>
+            <a:normAutofit fontScale="92500" lnSpcReduction="10000"/>
           </a:bodyPr>
           <a:lstStyle/>
           <a:p>
@@ -7463,35 +7463,35 @@
               <a:buNone/>
             </a:pPr>
             <a:r>
-              <a:rPr lang="en-US" dirty="0">
+              <a:rPr lang="en-US" sz="1200" dirty="0">
                 <a:latin typeface="Courier New" panose="02070309020205020404" pitchFamily="49" charset="0"/>
                 <a:cs typeface="Courier New" panose="02070309020205020404" pitchFamily="49" charset="0"/>
               </a:rPr>
               <a:t>export class </a:t>
             </a:r>
             <a:r>
-              <a:rPr lang="en-US" dirty="0" err="1">
+              <a:rPr lang="en-US" sz="1200" dirty="0" err="1">
                 <a:latin typeface="Courier New" panose="02070309020205020404" pitchFamily="49" charset="0"/>
                 <a:cs typeface="Courier New" panose="02070309020205020404" pitchFamily="49" charset="0"/>
               </a:rPr>
               <a:t>ConvoBot</a:t>
             </a:r>
             <a:r>
-              <a:rPr lang="en-US" dirty="0">
+              <a:rPr lang="en-US" sz="1200" dirty="0">
                 <a:latin typeface="Courier New" panose="02070309020205020404" pitchFamily="49" charset="0"/>
                 <a:cs typeface="Courier New" panose="02070309020205020404" pitchFamily="49" charset="0"/>
               </a:rPr>
               <a:t> extends </a:t>
             </a:r>
             <a:r>
-              <a:rPr lang="en-US" dirty="0" err="1">
+              <a:rPr lang="en-US" sz="1200" dirty="0" err="1">
                 <a:latin typeface="Courier New" panose="02070309020205020404" pitchFamily="49" charset="0"/>
                 <a:cs typeface="Courier New" panose="02070309020205020404" pitchFamily="49" charset="0"/>
               </a:rPr>
               <a:t>TeamsActivityHandler</a:t>
             </a:r>
             <a:r>
-              <a:rPr lang="en-US" dirty="0">
+              <a:rPr lang="en-US" sz="1200" dirty="0">
                 <a:latin typeface="Courier New" panose="02070309020205020404" pitchFamily="49" charset="0"/>
                 <a:cs typeface="Courier New" panose="02070309020205020404" pitchFamily="49" charset="0"/>
               </a:rPr>
@@ -7503,7 +7503,7 @@
               <a:buNone/>
             </a:pPr>
             <a:r>
-              <a:rPr lang="en-US" dirty="0">
+              <a:rPr lang="en-US" sz="1200" dirty="0">
                 <a:latin typeface="Courier New" panose="02070309020205020404" pitchFamily="49" charset="0"/>
                 <a:cs typeface="Courier New" panose="02070309020205020404" pitchFamily="49" charset="0"/>
               </a:rPr>
@@ -7515,7 +7515,7 @@
               <a:buNone/>
             </a:pPr>
             <a:r>
-              <a:rPr lang="en-US" dirty="0">
+              <a:rPr lang="en-US" sz="1200" dirty="0">
                 <a:latin typeface="Courier New" panose="02070309020205020404" pitchFamily="49" charset="0"/>
                 <a:cs typeface="Courier New" panose="02070309020205020404" pitchFamily="49" charset="0"/>
               </a:rPr>
@@ -7527,21 +7527,21 @@
               <a:buNone/>
             </a:pPr>
             <a:r>
-              <a:rPr lang="en-US" dirty="0">
+              <a:rPr lang="en-US" sz="1200" dirty="0">
                 <a:latin typeface="Courier New" panose="02070309020205020404" pitchFamily="49" charset="0"/>
                 <a:cs typeface="Courier New" panose="02070309020205020404" pitchFamily="49" charset="0"/>
               </a:rPr>
               <a:t>    </a:t>
             </a:r>
             <a:r>
-              <a:rPr lang="en-US" dirty="0" err="1">
+              <a:rPr lang="en-US" sz="1200" dirty="0" err="1">
                 <a:latin typeface="Courier New" panose="02070309020205020404" pitchFamily="49" charset="0"/>
                 <a:cs typeface="Courier New" panose="02070309020205020404" pitchFamily="49" charset="0"/>
               </a:rPr>
               <a:t>this.onMessage</a:t>
             </a:r>
             <a:r>
-              <a:rPr lang="en-US" dirty="0">
+              <a:rPr lang="en-US" sz="1200" dirty="0">
                 <a:latin typeface="Courier New" panose="02070309020205020404" pitchFamily="49" charset="0"/>
                 <a:cs typeface="Courier New" panose="02070309020205020404" pitchFamily="49" charset="0"/>
               </a:rPr>
@@ -7553,49 +7553,49 @@
               <a:buNone/>
             </a:pPr>
             <a:r>
-              <a:rPr lang="en-US" dirty="0">
+              <a:rPr lang="en-US" sz="1200" dirty="0">
                 <a:latin typeface="Courier New" panose="02070309020205020404" pitchFamily="49" charset="0"/>
                 <a:cs typeface="Courier New" panose="02070309020205020404" pitchFamily="49" charset="0"/>
               </a:rPr>
               <a:t>      const </a:t>
             </a:r>
             <a:r>
-              <a:rPr lang="en-US" dirty="0" err="1">
+              <a:rPr lang="en-US" sz="1200" dirty="0" err="1">
                 <a:latin typeface="Courier New" panose="02070309020205020404" pitchFamily="49" charset="0"/>
                 <a:cs typeface="Courier New" panose="02070309020205020404" pitchFamily="49" charset="0"/>
               </a:rPr>
               <a:t>botMessageText</a:t>
             </a:r>
             <a:r>
-              <a:rPr lang="en-US" dirty="0">
+              <a:rPr lang="en-US" sz="1200" dirty="0">
                 <a:latin typeface="Courier New" panose="02070309020205020404" pitchFamily="49" charset="0"/>
                 <a:cs typeface="Courier New" panose="02070309020205020404" pitchFamily="49" charset="0"/>
               </a:rPr>
               <a:t>: string = </a:t>
             </a:r>
             <a:r>
-              <a:rPr lang="en-US" dirty="0" err="1">
+              <a:rPr lang="en-US" sz="1200" dirty="0" err="1">
                 <a:latin typeface="Courier New" panose="02070309020205020404" pitchFamily="49" charset="0"/>
                 <a:cs typeface="Courier New" panose="02070309020205020404" pitchFamily="49" charset="0"/>
               </a:rPr>
               <a:t>context.activity.text.trim</a:t>
             </a:r>
             <a:r>
-              <a:rPr lang="en-US" dirty="0">
+              <a:rPr lang="en-US" sz="1200" dirty="0">
                 <a:latin typeface="Courier New" panose="02070309020205020404" pitchFamily="49" charset="0"/>
                 <a:cs typeface="Courier New" panose="02070309020205020404" pitchFamily="49" charset="0"/>
               </a:rPr>
               <a:t>().</a:t>
             </a:r>
             <a:r>
-              <a:rPr lang="en-US" dirty="0" err="1">
+              <a:rPr lang="en-US" sz="1200" dirty="0" err="1">
                 <a:latin typeface="Courier New" panose="02070309020205020404" pitchFamily="49" charset="0"/>
                 <a:cs typeface="Courier New" panose="02070309020205020404" pitchFamily="49" charset="0"/>
               </a:rPr>
               <a:t>toLowerCase</a:t>
             </a:r>
             <a:r>
-              <a:rPr lang="en-US" dirty="0">
+              <a:rPr lang="en-US" sz="1200" dirty="0">
                 <a:latin typeface="Courier New" panose="02070309020205020404" pitchFamily="49" charset="0"/>
                 <a:cs typeface="Courier New" panose="02070309020205020404" pitchFamily="49" charset="0"/>
               </a:rPr>
@@ -7607,35 +7607,35 @@
               <a:buNone/>
             </a:pPr>
             <a:r>
-              <a:rPr lang="en-US" dirty="0">
+              <a:rPr lang="en-US" sz="1200" dirty="0">
                 <a:latin typeface="Courier New" panose="02070309020205020404" pitchFamily="49" charset="0"/>
                 <a:cs typeface="Courier New" panose="02070309020205020404" pitchFamily="49" charset="0"/>
               </a:rPr>
               <a:t>      if (</a:t>
             </a:r>
             <a:r>
-              <a:rPr lang="en-US" dirty="0" err="1">
+              <a:rPr lang="en-US" sz="1200" dirty="0" err="1">
                 <a:latin typeface="Courier New" panose="02070309020205020404" pitchFamily="49" charset="0"/>
                 <a:cs typeface="Courier New" panose="02070309020205020404" pitchFamily="49" charset="0"/>
               </a:rPr>
               <a:t>botMessageText</a:t>
             </a:r>
             <a:r>
-              <a:rPr lang="en-US" dirty="0">
+              <a:rPr lang="en-US" sz="1200" dirty="0">
                 <a:latin typeface="Courier New" panose="02070309020205020404" pitchFamily="49" charset="0"/>
                 <a:cs typeface="Courier New" panose="02070309020205020404" pitchFamily="49" charset="0"/>
               </a:rPr>
               <a:t> === "</a:t>
             </a:r>
             <a:r>
-              <a:rPr lang="en-US" dirty="0" err="1">
+              <a:rPr lang="en-US" sz="1200" dirty="0" err="1">
                 <a:latin typeface="Courier New" panose="02070309020205020404" pitchFamily="49" charset="0"/>
                 <a:cs typeface="Courier New" panose="02070309020205020404" pitchFamily="49" charset="0"/>
               </a:rPr>
               <a:t>mentionme</a:t>
             </a:r>
             <a:r>
-              <a:rPr lang="en-US" dirty="0">
+              <a:rPr lang="en-US" sz="1200" dirty="0">
                 <a:latin typeface="Courier New" panose="02070309020205020404" pitchFamily="49" charset="0"/>
                 <a:cs typeface="Courier New" panose="02070309020205020404" pitchFamily="49" charset="0"/>
               </a:rPr>
@@ -7647,21 +7647,21 @@
               <a:buNone/>
             </a:pPr>
             <a:r>
-              <a:rPr lang="en-US" dirty="0">
+              <a:rPr lang="en-US" sz="1200" dirty="0">
                 <a:latin typeface="Courier New" panose="02070309020205020404" pitchFamily="49" charset="0"/>
                 <a:cs typeface="Courier New" panose="02070309020205020404" pitchFamily="49" charset="0"/>
               </a:rPr>
               <a:t>        const mention = { mentioned: </a:t>
             </a:r>
             <a:r>
-              <a:rPr lang="en-US" dirty="0" err="1">
+              <a:rPr lang="en-US" sz="1200" dirty="0" err="1">
                 <a:latin typeface="Courier New" panose="02070309020205020404" pitchFamily="49" charset="0"/>
                 <a:cs typeface="Courier New" panose="02070309020205020404" pitchFamily="49" charset="0"/>
               </a:rPr>
               <a:t>context.activity.from</a:t>
             </a:r>
             <a:r>
-              <a:rPr lang="en-US" dirty="0">
+              <a:rPr lang="en-US" sz="1200" dirty="0">
                 <a:latin typeface="Courier New" panose="02070309020205020404" pitchFamily="49" charset="0"/>
                 <a:cs typeface="Courier New" panose="02070309020205020404" pitchFamily="49" charset="0"/>
               </a:rPr>
@@ -7673,35 +7673,35 @@
               <a:buNone/>
             </a:pPr>
             <a:r>
-              <a:rPr lang="en-US" dirty="0">
+              <a:rPr lang="en-US" sz="1200" dirty="0">
                 <a:latin typeface="Courier New" panose="02070309020205020404" pitchFamily="49" charset="0"/>
                 <a:cs typeface="Courier New" panose="02070309020205020404" pitchFamily="49" charset="0"/>
               </a:rPr>
               <a:t>          text: `&lt;at&gt;${new </a:t>
             </a:r>
             <a:r>
-              <a:rPr lang="en-US" dirty="0" err="1">
+              <a:rPr lang="en-US" sz="1200" dirty="0" err="1">
                 <a:latin typeface="Courier New" panose="02070309020205020404" pitchFamily="49" charset="0"/>
                 <a:cs typeface="Courier New" panose="02070309020205020404" pitchFamily="49" charset="0"/>
               </a:rPr>
               <a:t>TextEncoder</a:t>
             </a:r>
             <a:r>
-              <a:rPr lang="en-US" dirty="0">
+              <a:rPr lang="en-US" sz="1200" dirty="0">
                 <a:latin typeface="Courier New" panose="02070309020205020404" pitchFamily="49" charset="0"/>
                 <a:cs typeface="Courier New" panose="02070309020205020404" pitchFamily="49" charset="0"/>
               </a:rPr>
               <a:t>().encode(</a:t>
             </a:r>
             <a:r>
-              <a:rPr lang="en-US" dirty="0" err="1">
+              <a:rPr lang="en-US" sz="1200" dirty="0" err="1">
                 <a:latin typeface="Courier New" panose="02070309020205020404" pitchFamily="49" charset="0"/>
                 <a:cs typeface="Courier New" panose="02070309020205020404" pitchFamily="49" charset="0"/>
               </a:rPr>
               <a:t>context.activity.from.name</a:t>
             </a:r>
             <a:r>
-              <a:rPr lang="en-US" dirty="0">
+              <a:rPr lang="en-US" sz="1200" dirty="0">
                 <a:latin typeface="Courier New" panose="02070309020205020404" pitchFamily="49" charset="0"/>
                 <a:cs typeface="Courier New" panose="02070309020205020404" pitchFamily="49" charset="0"/>
               </a:rPr>
@@ -7713,7 +7713,7 @@
               <a:buNone/>
             </a:pPr>
             <a:r>
-              <a:rPr lang="en-US" dirty="0">
+              <a:rPr lang="en-US" sz="1200" dirty="0">
                 <a:latin typeface="Courier New" panose="02070309020205020404" pitchFamily="49" charset="0"/>
                 <a:cs typeface="Courier New" panose="02070309020205020404" pitchFamily="49" charset="0"/>
               </a:rPr>
@@ -7725,49 +7725,49 @@
               <a:buNone/>
             </a:pPr>
             <a:r>
-              <a:rPr lang="en-US" dirty="0">
+              <a:rPr lang="en-US" sz="1200" dirty="0">
                 <a:latin typeface="Courier New" panose="02070309020205020404" pitchFamily="49" charset="0"/>
                 <a:cs typeface="Courier New" panose="02070309020205020404" pitchFamily="49" charset="0"/>
               </a:rPr>
               <a:t>        const </a:t>
             </a:r>
             <a:r>
-              <a:rPr lang="en-US" dirty="0" err="1">
+              <a:rPr lang="en-US" sz="1200" dirty="0" err="1">
                 <a:latin typeface="Courier New" panose="02070309020205020404" pitchFamily="49" charset="0"/>
                 <a:cs typeface="Courier New" panose="02070309020205020404" pitchFamily="49" charset="0"/>
               </a:rPr>
               <a:t>replyActivity</a:t>
             </a:r>
             <a:r>
-              <a:rPr lang="en-US" dirty="0">
+              <a:rPr lang="en-US" sz="1200" dirty="0">
                 <a:latin typeface="Courier New" panose="02070309020205020404" pitchFamily="49" charset="0"/>
                 <a:cs typeface="Courier New" panose="02070309020205020404" pitchFamily="49" charset="0"/>
               </a:rPr>
               <a:t> = </a:t>
             </a:r>
             <a:r>
-              <a:rPr lang="en-US" dirty="0" err="1">
+              <a:rPr lang="en-US" sz="1200" dirty="0" err="1">
                 <a:latin typeface="Courier New" panose="02070309020205020404" pitchFamily="49" charset="0"/>
                 <a:cs typeface="Courier New" panose="02070309020205020404" pitchFamily="49" charset="0"/>
               </a:rPr>
               <a:t>MessageFactory.text</a:t>
             </a:r>
             <a:r>
-              <a:rPr lang="en-US" dirty="0">
+              <a:rPr lang="en-US" sz="1200" dirty="0">
                 <a:latin typeface="Courier New" panose="02070309020205020404" pitchFamily="49" charset="0"/>
                 <a:cs typeface="Courier New" panose="02070309020205020404" pitchFamily="49" charset="0"/>
               </a:rPr>
               <a:t>(`Hi ${</a:t>
             </a:r>
             <a:r>
-              <a:rPr lang="en-US" dirty="0" err="1">
+              <a:rPr lang="en-US" sz="1200" dirty="0" err="1">
                 <a:latin typeface="Courier New" panose="02070309020205020404" pitchFamily="49" charset="0"/>
                 <a:cs typeface="Courier New" panose="02070309020205020404" pitchFamily="49" charset="0"/>
               </a:rPr>
               <a:t>mention.text</a:t>
             </a:r>
             <a:r>
-              <a:rPr lang="en-US" dirty="0">
+              <a:rPr lang="en-US" sz="1200" dirty="0">
                 <a:latin typeface="Courier New" panose="02070309020205020404" pitchFamily="49" charset="0"/>
                 <a:cs typeface="Courier New" panose="02070309020205020404" pitchFamily="49" charset="0"/>
               </a:rPr>
@@ -7779,21 +7779,21 @@
               <a:buNone/>
             </a:pPr>
             <a:r>
-              <a:rPr lang="en-US" dirty="0">
+              <a:rPr lang="en-US" sz="1200" dirty="0">
                 <a:latin typeface="Courier New" panose="02070309020205020404" pitchFamily="49" charset="0"/>
                 <a:cs typeface="Courier New" panose="02070309020205020404" pitchFamily="49" charset="0"/>
               </a:rPr>
               <a:t>        </a:t>
             </a:r>
             <a:r>
-              <a:rPr lang="en-US" dirty="0" err="1">
+              <a:rPr lang="en-US" sz="1200" dirty="0" err="1">
                 <a:latin typeface="Courier New" panose="02070309020205020404" pitchFamily="49" charset="0"/>
                 <a:cs typeface="Courier New" panose="02070309020205020404" pitchFamily="49" charset="0"/>
               </a:rPr>
               <a:t>replyActivity.entities</a:t>
             </a:r>
             <a:r>
-              <a:rPr lang="en-US" dirty="0">
+              <a:rPr lang="en-US" sz="1200" dirty="0">
                 <a:latin typeface="Courier New" panose="02070309020205020404" pitchFamily="49" charset="0"/>
                 <a:cs typeface="Courier New" panose="02070309020205020404" pitchFamily="49" charset="0"/>
               </a:rPr>
@@ -7805,35 +7805,35 @@
               <a:buNone/>
             </a:pPr>
             <a:r>
-              <a:rPr lang="en-US" dirty="0">
+              <a:rPr lang="en-US" sz="1200" dirty="0">
                 <a:latin typeface="Courier New" panose="02070309020205020404" pitchFamily="49" charset="0"/>
                 <a:cs typeface="Courier New" panose="02070309020205020404" pitchFamily="49" charset="0"/>
               </a:rPr>
               <a:t>        await </a:t>
             </a:r>
             <a:r>
-              <a:rPr lang="en-US" dirty="0" err="1">
+              <a:rPr lang="en-US" sz="1200" dirty="0" err="1">
                 <a:latin typeface="Courier New" panose="02070309020205020404" pitchFamily="49" charset="0"/>
                 <a:cs typeface="Courier New" panose="02070309020205020404" pitchFamily="49" charset="0"/>
               </a:rPr>
               <a:t>context.sendActivity</a:t>
             </a:r>
             <a:r>
-              <a:rPr lang="en-US" dirty="0">
+              <a:rPr lang="en-US" sz="1200" dirty="0">
                 <a:latin typeface="Courier New" panose="02070309020205020404" pitchFamily="49" charset="0"/>
                 <a:cs typeface="Courier New" panose="02070309020205020404" pitchFamily="49" charset="0"/>
               </a:rPr>
               <a:t>(</a:t>
             </a:r>
             <a:r>
-              <a:rPr lang="en-US" dirty="0" err="1">
+              <a:rPr lang="en-US" sz="1200" dirty="0" err="1">
                 <a:latin typeface="Courier New" panose="02070309020205020404" pitchFamily="49" charset="0"/>
                 <a:cs typeface="Courier New" panose="02070309020205020404" pitchFamily="49" charset="0"/>
               </a:rPr>
               <a:t>replyActivity</a:t>
             </a:r>
             <a:r>
-              <a:rPr lang="en-US" dirty="0">
+              <a:rPr lang="en-US" sz="1200" dirty="0">
                 <a:latin typeface="Courier New" panose="02070309020205020404" pitchFamily="49" charset="0"/>
                 <a:cs typeface="Courier New" panose="02070309020205020404" pitchFamily="49" charset="0"/>
               </a:rPr>
@@ -7845,7 +7845,7 @@
               <a:buNone/>
             </a:pPr>
             <a:r>
-              <a:rPr lang="en-US" dirty="0">
+              <a:rPr lang="en-US" sz="1200" dirty="0">
                 <a:latin typeface="Courier New" panose="02070309020205020404" pitchFamily="49" charset="0"/>
                 <a:cs typeface="Courier New" panose="02070309020205020404" pitchFamily="49" charset="0"/>
               </a:rPr>
@@ -7857,7 +7857,7 @@
               <a:buNone/>
             </a:pPr>
             <a:r>
-              <a:rPr lang="en-US" dirty="0">
+              <a:rPr lang="en-US" sz="1200" dirty="0">
                 <a:latin typeface="Courier New" panose="02070309020205020404" pitchFamily="49" charset="0"/>
                 <a:cs typeface="Courier New" panose="02070309020205020404" pitchFamily="49" charset="0"/>
               </a:rPr>
@@ -7869,7 +7869,7 @@
               <a:buNone/>
             </a:pPr>
             <a:r>
-              <a:rPr lang="en-US" dirty="0">
+              <a:rPr lang="en-US" sz="1200" dirty="0">
                 <a:latin typeface="Courier New" panose="02070309020205020404" pitchFamily="49" charset="0"/>
                 <a:cs typeface="Courier New" panose="02070309020205020404" pitchFamily="49" charset="0"/>
               </a:rPr>
@@ -7881,7 +7881,7 @@
               <a:buNone/>
             </a:pPr>
             <a:r>
-              <a:rPr lang="en-US" dirty="0">
+              <a:rPr lang="en-US" sz="1200" dirty="0">
                 <a:latin typeface="Courier New" panose="02070309020205020404" pitchFamily="49" charset="0"/>
                 <a:cs typeface="Courier New" panose="02070309020205020404" pitchFamily="49" charset="0"/>
               </a:rPr>
@@ -7889,7 +7889,7 @@
             </a:r>
           </a:p>
           <a:p>
-            <a:endParaRPr lang="en-US" dirty="0"/>
+            <a:endParaRPr lang="en-US" sz="1200" dirty="0"/>
           </a:p>
         </p:txBody>
       </p:sp>
@@ -7979,7 +7979,14 @@
             </a:pPr>
             <a:r>
               <a:rPr lang="en-US" dirty="0"/>
-              <a:t>The web service must be registered as a bot with the Microsoft Bot Framework</a:t>
+              <a:t>The web service must be registered as a bot with the </a:t>
+            </a:r>
+            <a:br>
+              <a:rPr lang="en-US" dirty="0"/>
+            </a:br>
+            <a:r>
+              <a:rPr lang="en-US" dirty="0"/>
+              <a:t>Microsoft Bot Framework</a:t>
             </a:r>
           </a:p>
           <a:p>
@@ -8093,13 +8100,13 @@
         <p:spPr/>
         <p:txBody>
           <a:bodyPr>
-            <a:normAutofit fontScale="90000"/>
+            <a:normAutofit/>
           </a:bodyPr>
           <a:lstStyle/>
           <a:p>
             <a:r>
               <a:rPr lang="en-US" dirty="0"/>
-              <a:t>Create your Microsoft Teams app manifest and app package with App Studio</a:t>
+              <a:t>Create your Microsoft Teams app manifest &amp; app package with the Developer Portal</a:t>
             </a:r>
           </a:p>
         </p:txBody>
@@ -8120,14 +8127,13 @@
         </p:nvPicPr>
         <p:blipFill>
           <a:blip r:embed="rId2"/>
-          <a:stretch>
-            <a:fillRect/>
-          </a:stretch>
+          <a:srcRect/>
+          <a:stretch/>
         </p:blipFill>
         <p:spPr>
           <a:xfrm>
-            <a:off x="3093561" y="1825625"/>
-            <a:ext cx="6004877" cy="4293487"/>
+            <a:off x="3093561" y="1960762"/>
+            <a:ext cx="6004877" cy="4023213"/>
           </a:xfrm>
           <a:prstGeom prst="rect">
             <a:avLst/>
@@ -8652,7 +8658,14 @@
             </a:pPr>
             <a:r>
               <a:rPr lang="en-US" dirty="0"/>
-              <a:t>Must be @mentioned to activate the bot in a team conversation / group chat</a:t>
+              <a:t>Must be @mentioned to activate the bot in a </a:t>
+            </a:r>
+            <a:br>
+              <a:rPr lang="en-US" dirty="0"/>
+            </a:br>
+            <a:r>
+              <a:rPr lang="en-US" dirty="0"/>
+              <a:t>team conversation / group chat</a:t>
             </a:r>
           </a:p>
           <a:p>
@@ -8779,7 +8792,14 @@
             </a:r>
             <a:r>
               <a:rPr lang="en-US" dirty="0"/>
-              <a:t> and contain a </a:t>
+              <a:t> and contain </a:t>
+            </a:r>
+            <a:br>
+              <a:rPr lang="en-US" dirty="0"/>
+            </a:br>
+            <a:r>
+              <a:rPr lang="en-US" dirty="0"/>
+              <a:t>a </a:t>
             </a:r>
             <a:r>
               <a:rPr lang="en-US" dirty="0" err="1">
@@ -9284,7 +9304,7 @@
         <p:spPr/>
         <p:txBody>
           <a:bodyPr>
-            <a:normAutofit fontScale="92500" lnSpcReduction="20000"/>
+            <a:normAutofit fontScale="92500" lnSpcReduction="10000"/>
           </a:bodyPr>
           <a:lstStyle/>
           <a:p>
@@ -9293,7 +9313,7 @@
             </a:pPr>
             <a:r>
               <a:rPr lang="en-US" dirty="0"/>
-              <a:t>Microsoft Teams sends notifications to your bot for events that happen in </a:t>
+              <a:t>Microsoft Teams sends notifications to your bot for events that happen </a:t>
             </a:r>
             <a:br>
               <a:rPr lang="en-US" dirty="0"/>
@@ -9329,7 +9349,14 @@
             <a:pPr marL="342900" indent="-342900"/>
             <a:r>
               <a:rPr lang="en-US" dirty="0"/>
-              <a:t>Trigger welcome message when a new team member is added or removed</a:t>
+              <a:t>Trigger welcome message when a new team member is </a:t>
+            </a:r>
+            <a:br>
+              <a:rPr lang="en-US" dirty="0"/>
+            </a:br>
+            <a:r>
+              <a:rPr lang="en-US" dirty="0"/>
+              <a:t>added or removed</a:t>
             </a:r>
           </a:p>
           <a:p>
@@ -9428,7 +9455,7 @@
         <p:spPr/>
         <p:txBody>
           <a:bodyPr>
-            <a:normAutofit fontScale="92500" lnSpcReduction="20000"/>
+            <a:normAutofit fontScale="92500" lnSpcReduction="10000"/>
           </a:bodyPr>
           <a:lstStyle/>
           <a:p>
@@ -9482,14 +9509,7 @@
             </a:pPr>
             <a:r>
               <a:rPr lang="en-US" dirty="0"/>
-              <a:t>The event is sent to your bot when it receives information on membership updates to</a:t>
-            </a:r>
-            <a:br>
-              <a:rPr lang="en-US" dirty="0"/>
-            </a:br>
-            <a:r>
-              <a:rPr lang="en-US" dirty="0"/>
-              <a:t>teams where it’s been added</a:t>
+              <a:t>The event is sent to your bot when it receives information on membership updates to teams where it’s been added</a:t>
             </a:r>
           </a:p>
           <a:p>
@@ -9595,9 +9615,6 @@
             </a:pPr>
             <a:r>
               <a:rPr lang="en-US" dirty="0">
-                <a:solidFill>
-                  <a:schemeClr val="tx1"/>
-                </a:solidFill>
                 <a:latin typeface="Courier New" panose="02070309020205020404" pitchFamily="49" charset="0"/>
                 <a:cs typeface="Courier New" panose="02070309020205020404" pitchFamily="49" charset="0"/>
               </a:rPr>
@@ -9605,9 +9622,6 @@
             </a:r>
             <a:r>
               <a:rPr lang="en-US" dirty="0" err="1">
-                <a:solidFill>
-                  <a:schemeClr val="tx1"/>
-                </a:solidFill>
                 <a:latin typeface="Courier New" panose="02070309020205020404" pitchFamily="49" charset="0"/>
                 <a:cs typeface="Courier New" panose="02070309020205020404" pitchFamily="49" charset="0"/>
               </a:rPr>
@@ -9615,9 +9629,6 @@
             </a:r>
             <a:r>
               <a:rPr lang="en-US" dirty="0">
-                <a:solidFill>
-                  <a:schemeClr val="tx1"/>
-                </a:solidFill>
                 <a:latin typeface="Courier New" panose="02070309020205020404" pitchFamily="49" charset="0"/>
                 <a:cs typeface="Courier New" panose="02070309020205020404" pitchFamily="49" charset="0"/>
               </a:rPr>
@@ -9625,9 +9636,6 @@
             </a:r>
             <a:r>
               <a:rPr lang="en-US" dirty="0" err="1">
-                <a:solidFill>
-                  <a:schemeClr val="tx1"/>
-                </a:solidFill>
                 <a:latin typeface="Courier New" panose="02070309020205020404" pitchFamily="49" charset="0"/>
                 <a:cs typeface="Courier New" panose="02070309020205020404" pitchFamily="49" charset="0"/>
               </a:rPr>
@@ -9635,9 +9643,6 @@
             </a:r>
             <a:r>
               <a:rPr lang="en-US" dirty="0">
-                <a:solidFill>
-                  <a:schemeClr val="tx1"/>
-                </a:solidFill>
                 <a:latin typeface="Courier New" panose="02070309020205020404" pitchFamily="49" charset="0"/>
                 <a:cs typeface="Courier New" panose="02070309020205020404" pitchFamily="49" charset="0"/>
               </a:rPr>
@@ -9650,9 +9655,6 @@
             </a:pPr>
             <a:r>
               <a:rPr lang="en-US" dirty="0">
-                <a:solidFill>
-                  <a:schemeClr val="tx1"/>
-                </a:solidFill>
                 <a:latin typeface="Courier New" panose="02070309020205020404" pitchFamily="49" charset="0"/>
                 <a:cs typeface="Courier New" panose="02070309020205020404" pitchFamily="49" charset="0"/>
               </a:rPr>
@@ -9665,9 +9667,6 @@
             </a:pPr>
             <a:r>
               <a:rPr lang="en-US" dirty="0">
-                <a:solidFill>
-                  <a:schemeClr val="tx1"/>
-                </a:solidFill>
                 <a:latin typeface="Courier New" panose="02070309020205020404" pitchFamily="49" charset="0"/>
                 <a:cs typeface="Courier New" panose="02070309020205020404" pitchFamily="49" charset="0"/>
               </a:rPr>
@@ -9676,9 +9675,6 @@
           </a:p>
           <a:p>
             <a:endParaRPr lang="en-US" dirty="0">
-              <a:solidFill>
-                <a:schemeClr val="tx1"/>
-              </a:solidFill>
               <a:latin typeface="Courier New" panose="02070309020205020404" pitchFamily="49" charset="0"/>
               <a:cs typeface="Courier New" panose="02070309020205020404" pitchFamily="49" charset="0"/>
             </a:endParaRPr>
@@ -9689,9 +9685,6 @@
             </a:pPr>
             <a:r>
               <a:rPr lang="en-US" dirty="0">
-                <a:solidFill>
-                  <a:schemeClr val="tx1"/>
-                </a:solidFill>
                 <a:latin typeface="Courier New" panose="02070309020205020404" pitchFamily="49" charset="0"/>
                 <a:cs typeface="Courier New" panose="02070309020205020404" pitchFamily="49" charset="0"/>
               </a:rPr>
@@ -9699,9 +9692,6 @@
             </a:r>
             <a:r>
               <a:rPr lang="en-US" dirty="0" err="1">
-                <a:solidFill>
-                  <a:schemeClr val="tx1"/>
-                </a:solidFill>
                 <a:latin typeface="Courier New" panose="02070309020205020404" pitchFamily="49" charset="0"/>
                 <a:cs typeface="Courier New" panose="02070309020205020404" pitchFamily="49" charset="0"/>
               </a:rPr>
@@ -9709,9 +9699,6 @@
             </a:r>
             <a:r>
               <a:rPr lang="en-US" dirty="0">
-                <a:solidFill>
-                  <a:schemeClr val="tx1"/>
-                </a:solidFill>
                 <a:latin typeface="Courier New" panose="02070309020205020404" pitchFamily="49" charset="0"/>
                 <a:cs typeface="Courier New" panose="02070309020205020404" pitchFamily="49" charset="0"/>
               </a:rPr>
@@ -9719,9 +9706,6 @@
             </a:r>
             <a:r>
               <a:rPr lang="en-US" dirty="0" err="1">
-                <a:solidFill>
-                  <a:schemeClr val="tx1"/>
-                </a:solidFill>
                 <a:latin typeface="Courier New" panose="02070309020205020404" pitchFamily="49" charset="0"/>
                 <a:cs typeface="Courier New" panose="02070309020205020404" pitchFamily="49" charset="0"/>
               </a:rPr>
@@ -9729,9 +9713,6 @@
             </a:r>
             <a:r>
               <a:rPr lang="en-US" dirty="0">
-                <a:solidFill>
-                  <a:schemeClr val="tx1"/>
-                </a:solidFill>
                 <a:latin typeface="Courier New" panose="02070309020205020404" pitchFamily="49" charset="0"/>
                 <a:cs typeface="Courier New" panose="02070309020205020404" pitchFamily="49" charset="0"/>
               </a:rPr>
@@ -9739,9 +9720,6 @@
             </a:r>
             <a:r>
               <a:rPr lang="en-US" dirty="0" err="1">
-                <a:solidFill>
-                  <a:schemeClr val="tx1"/>
-                </a:solidFill>
                 <a:latin typeface="Courier New" panose="02070309020205020404" pitchFamily="49" charset="0"/>
                 <a:cs typeface="Courier New" panose="02070309020205020404" pitchFamily="49" charset="0"/>
               </a:rPr>
@@ -9749,9 +9727,6 @@
             </a:r>
             <a:r>
               <a:rPr lang="en-US" dirty="0">
-                <a:solidFill>
-                  <a:schemeClr val="tx1"/>
-                </a:solidFill>
                 <a:latin typeface="Courier New" panose="02070309020205020404" pitchFamily="49" charset="0"/>
                 <a:cs typeface="Courier New" panose="02070309020205020404" pitchFamily="49" charset="0"/>
               </a:rPr>
@@ -9759,9 +9734,6 @@
             </a:r>
             <a:r>
               <a:rPr lang="en-US" dirty="0" err="1">
-                <a:solidFill>
-                  <a:schemeClr val="tx1"/>
-                </a:solidFill>
                 <a:latin typeface="Courier New" panose="02070309020205020404" pitchFamily="49" charset="0"/>
                 <a:cs typeface="Courier New" panose="02070309020205020404" pitchFamily="49" charset="0"/>
               </a:rPr>
@@ -9769,9 +9741,6 @@
             </a:r>
             <a:r>
               <a:rPr lang="en-US" dirty="0">
-                <a:solidFill>
-                  <a:schemeClr val="tx1"/>
-                </a:solidFill>
                 <a:latin typeface="Courier New" panose="02070309020205020404" pitchFamily="49" charset="0"/>
                 <a:cs typeface="Courier New" panose="02070309020205020404" pitchFamily="49" charset="0"/>
               </a:rPr>
@@ -9779,9 +9748,6 @@
             </a:r>
             <a:r>
               <a:rPr lang="en-US" dirty="0" err="1">
-                <a:solidFill>
-                  <a:schemeClr val="tx1"/>
-                </a:solidFill>
                 <a:latin typeface="Courier New" panose="02070309020205020404" pitchFamily="49" charset="0"/>
                 <a:cs typeface="Courier New" panose="02070309020205020404" pitchFamily="49" charset="0"/>
               </a:rPr>
@@ -9789,9 +9755,6 @@
             </a:r>
             <a:r>
               <a:rPr lang="en-US" dirty="0">
-                <a:solidFill>
-                  <a:schemeClr val="tx1"/>
-                </a:solidFill>
                 <a:latin typeface="Courier New" panose="02070309020205020404" pitchFamily="49" charset="0"/>
                 <a:cs typeface="Courier New" panose="02070309020205020404" pitchFamily="49" charset="0"/>
               </a:rPr>
@@ -9799,9 +9762,6 @@
             </a:r>
             <a:r>
               <a:rPr lang="en-US" dirty="0" err="1">
-                <a:solidFill>
-                  <a:schemeClr val="tx1"/>
-                </a:solidFill>
                 <a:latin typeface="Courier New" panose="02070309020205020404" pitchFamily="49" charset="0"/>
                 <a:cs typeface="Courier New" panose="02070309020205020404" pitchFamily="49" charset="0"/>
               </a:rPr>
@@ -9809,9 +9769,6 @@
             </a:r>
             <a:r>
               <a:rPr lang="en-US" dirty="0">
-                <a:solidFill>
-                  <a:schemeClr val="tx1"/>
-                </a:solidFill>
                 <a:latin typeface="Courier New" panose="02070309020205020404" pitchFamily="49" charset="0"/>
                 <a:cs typeface="Courier New" panose="02070309020205020404" pitchFamily="49" charset="0"/>
               </a:rPr>
@@ -9819,9 +9776,6 @@
             </a:r>
             <a:r>
               <a:rPr lang="en-US" dirty="0" err="1">
-                <a:solidFill>
-                  <a:schemeClr val="tx1"/>
-                </a:solidFill>
                 <a:latin typeface="Courier New" panose="02070309020205020404" pitchFamily="49" charset="0"/>
                 <a:cs typeface="Courier New" panose="02070309020205020404" pitchFamily="49" charset="0"/>
               </a:rPr>
@@ -9829,9 +9783,6 @@
             </a:r>
             <a:r>
               <a:rPr lang="en-US" dirty="0">
-                <a:solidFill>
-                  <a:schemeClr val="tx1"/>
-                </a:solidFill>
                 <a:latin typeface="Courier New" panose="02070309020205020404" pitchFamily="49" charset="0"/>
                 <a:cs typeface="Courier New" panose="02070309020205020404" pitchFamily="49" charset="0"/>
               </a:rPr>
@@ -9844,9 +9795,6 @@
             </a:pPr>
             <a:r>
               <a:rPr lang="en-US" dirty="0">
-                <a:solidFill>
-                  <a:schemeClr val="tx1"/>
-                </a:solidFill>
                 <a:latin typeface="Courier New" panose="02070309020205020404" pitchFamily="49" charset="0"/>
                 <a:cs typeface="Courier New" panose="02070309020205020404" pitchFamily="49" charset="0"/>
               </a:rPr>
@@ -9854,9 +9802,6 @@
             </a:r>
             <a:r>
               <a:rPr lang="en-US" dirty="0" err="1">
-                <a:solidFill>
-                  <a:schemeClr val="tx1"/>
-                </a:solidFill>
                 <a:latin typeface="Courier New" panose="02070309020205020404" pitchFamily="49" charset="0"/>
                 <a:cs typeface="Courier New" panose="02070309020205020404" pitchFamily="49" charset="0"/>
               </a:rPr>
@@ -9864,9 +9809,6 @@
             </a:r>
             <a:r>
               <a:rPr lang="en-US" dirty="0">
-                <a:solidFill>
-                  <a:schemeClr val="tx1"/>
-                </a:solidFill>
                 <a:latin typeface="Courier New" panose="02070309020205020404" pitchFamily="49" charset="0"/>
                 <a:cs typeface="Courier New" panose="02070309020205020404" pitchFamily="49" charset="0"/>
               </a:rPr>
@@ -9879,9 +9821,6 @@
             </a:pPr>
             <a:r>
               <a:rPr lang="en-US" dirty="0">
-                <a:solidFill>
-                  <a:schemeClr val="tx1"/>
-                </a:solidFill>
                 <a:latin typeface="Courier New" panose="02070309020205020404" pitchFamily="49" charset="0"/>
                 <a:cs typeface="Courier New" panose="02070309020205020404" pitchFamily="49" charset="0"/>
               </a:rPr>
@@ -9889,9 +9828,6 @@
             </a:r>
             <a:r>
               <a:rPr lang="en-US" dirty="0" err="1">
-                <a:solidFill>
-                  <a:schemeClr val="tx1"/>
-                </a:solidFill>
                 <a:latin typeface="Courier New" panose="02070309020205020404" pitchFamily="49" charset="0"/>
                 <a:cs typeface="Courier New" panose="02070309020205020404" pitchFamily="49" charset="0"/>
               </a:rPr>
@@ -9899,9 +9835,6 @@
             </a:r>
             <a:r>
               <a:rPr lang="en-US" dirty="0">
-                <a:solidFill>
-                  <a:schemeClr val="tx1"/>
-                </a:solidFill>
                 <a:latin typeface="Courier New" panose="02070309020205020404" pitchFamily="49" charset="0"/>
                 <a:cs typeface="Courier New" panose="02070309020205020404" pitchFamily="49" charset="0"/>
               </a:rPr>
@@ -9914,9 +9847,6 @@
             </a:pPr>
             <a:r>
               <a:rPr lang="en-US" dirty="0">
-                <a:solidFill>
-                  <a:schemeClr val="tx1"/>
-                </a:solidFill>
                 <a:latin typeface="Courier New" panose="02070309020205020404" pitchFamily="49" charset="0"/>
                 <a:cs typeface="Courier New" panose="02070309020205020404" pitchFamily="49" charset="0"/>
               </a:rPr>
@@ -9924,9 +9854,6 @@
             </a:r>
             <a:r>
               <a:rPr lang="en-US" dirty="0" err="1">
-                <a:solidFill>
-                  <a:schemeClr val="tx1"/>
-                </a:solidFill>
                 <a:latin typeface="Courier New" panose="02070309020205020404" pitchFamily="49" charset="0"/>
                 <a:cs typeface="Courier New" panose="02070309020205020404" pitchFamily="49" charset="0"/>
               </a:rPr>
@@ -9934,9 +9861,6 @@
             </a:r>
             <a:r>
               <a:rPr lang="en-US" dirty="0">
-                <a:solidFill>
-                  <a:schemeClr val="tx1"/>
-                </a:solidFill>
                 <a:latin typeface="Courier New" panose="02070309020205020404" pitchFamily="49" charset="0"/>
                 <a:cs typeface="Courier New" panose="02070309020205020404" pitchFamily="49" charset="0"/>
               </a:rPr>
@@ -9949,9 +9873,6 @@
             </a:pPr>
             <a:r>
               <a:rPr lang="en-US" dirty="0">
-                <a:solidFill>
-                  <a:schemeClr val="tx1"/>
-                </a:solidFill>
                 <a:latin typeface="Courier New" panose="02070309020205020404" pitchFamily="49" charset="0"/>
                 <a:cs typeface="Courier New" panose="02070309020205020404" pitchFamily="49" charset="0"/>
               </a:rPr>
@@ -9964,9 +9885,6 @@
             </a:pPr>
             <a:r>
               <a:rPr lang="en-US" dirty="0">
-                <a:solidFill>
-                  <a:schemeClr val="tx1"/>
-                </a:solidFill>
                 <a:latin typeface="Courier New" panose="02070309020205020404" pitchFamily="49" charset="0"/>
                 <a:cs typeface="Courier New" panose="02070309020205020404" pitchFamily="49" charset="0"/>
               </a:rPr>
@@ -9979,9 +9897,6 @@
             </a:pPr>
             <a:r>
               <a:rPr lang="en-US" dirty="0">
-                <a:solidFill>
-                  <a:schemeClr val="tx1"/>
-                </a:solidFill>
                 <a:latin typeface="Courier New" panose="02070309020205020404" pitchFamily="49" charset="0"/>
                 <a:cs typeface="Courier New" panose="02070309020205020404" pitchFamily="49" charset="0"/>
               </a:rPr>
@@ -9994,9 +9909,6 @@
             </a:pPr>
             <a:r>
               <a:rPr lang="en-US" dirty="0">
-                <a:solidFill>
-                  <a:schemeClr val="tx1"/>
-                </a:solidFill>
                 <a:latin typeface="Courier New" panose="02070309020205020404" pitchFamily="49" charset="0"/>
                 <a:cs typeface="Courier New" panose="02070309020205020404" pitchFamily="49" charset="0"/>
               </a:rPr>
@@ -10004,11 +9916,7 @@
             </a:r>
           </a:p>
           <a:p>
-            <a:endParaRPr lang="en-US" dirty="0">
-              <a:solidFill>
-                <a:schemeClr val="tx1"/>
-              </a:solidFill>
-            </a:endParaRPr>
+            <a:endParaRPr lang="en-US" dirty="0"/>
           </a:p>
         </p:txBody>
       </p:sp>
@@ -10397,7 +10305,7 @@
         <p:spPr>
           <a:xfrm>
             <a:off x="3688615" y="3098982"/>
-            <a:ext cx="2743200" cy="1846659"/>
+            <a:ext cx="2271655" cy="1846659"/>
           </a:xfrm>
           <a:prstGeom prst="rect">
             <a:avLst/>
@@ -10674,11 +10582,12 @@
           </a:p>
           <a:p>
             <a:r>
-              <a:rPr lang="en-US" dirty="0" err="1">
+              <a:rPr lang="en-US" b="0" dirty="0" err="1">
                 <a:solidFill>
                   <a:schemeClr val="tx1"/>
                 </a:solidFill>
-                <a:latin typeface="+mj-lt"/>
+                <a:latin typeface="Consolas" panose="020B0609020204030204" pitchFamily="49" charset="0"/>
+                <a:cs typeface="Consolas" panose="020B0609020204030204" pitchFamily="49" charset="0"/>
               </a:rPr>
               <a:t>ChannelData</a:t>
             </a:r>
@@ -10971,11 +10880,12 @@
           </a:p>
           <a:p>
             <a:r>
-              <a:rPr lang="en-US" dirty="0" err="1">
+              <a:rPr lang="en-US" b="0" dirty="0" err="1">
                 <a:solidFill>
                   <a:schemeClr val="tx1"/>
                 </a:solidFill>
-                <a:latin typeface="+mj-lt"/>
+                <a:latin typeface="Consolas" panose="020B0609020204030204" pitchFamily="49" charset="0"/>
+                <a:cs typeface="Consolas" panose="020B0609020204030204" pitchFamily="49" charset="0"/>
               </a:rPr>
               <a:t>replyToId</a:t>
             </a:r>
@@ -11251,11 +11161,12 @@
           </a:p>
           <a:p>
             <a:r>
-              <a:rPr lang="en-US" dirty="0" err="1">
+              <a:rPr lang="en-US" b="0" dirty="0" err="1">
                 <a:solidFill>
                   <a:schemeClr val="tx1"/>
                 </a:solidFill>
-                <a:latin typeface="+mj-lt"/>
+                <a:latin typeface="Consolas" panose="020B0609020204030204" pitchFamily="49" charset="0"/>
+                <a:cs typeface="Consolas" panose="020B0609020204030204" pitchFamily="49" charset="0"/>
               </a:rPr>
               <a:t>ChannelData</a:t>
             </a:r>
@@ -11348,7 +11259,7 @@
         <p:spPr/>
         <p:txBody>
           <a:bodyPr>
-            <a:normAutofit fontScale="47500" lnSpcReduction="20000"/>
+            <a:normAutofit lnSpcReduction="10000"/>
           </a:bodyPr>
           <a:lstStyle/>
           <a:p>
@@ -11356,35 +11267,50 @@
               <a:buNone/>
             </a:pPr>
             <a:r>
-              <a:rPr lang="en-US" dirty="0">
+              <a:rPr lang="en-US" sz="1400" dirty="0">
+                <a:solidFill>
+                  <a:srgbClr val="3F115C"/>
+                </a:solidFill>
                 <a:latin typeface="Courier New" panose="02070309020205020404" pitchFamily="49" charset="0"/>
                 <a:cs typeface="Courier New" panose="02070309020205020404" pitchFamily="49" charset="0"/>
               </a:rPr>
               <a:t>export class </a:t>
             </a:r>
             <a:r>
-              <a:rPr lang="en-US" dirty="0" err="1">
+              <a:rPr lang="en-US" sz="1400" dirty="0" err="1">
+                <a:solidFill>
+                  <a:srgbClr val="3F115C"/>
+                </a:solidFill>
                 <a:latin typeface="Courier New" panose="02070309020205020404" pitchFamily="49" charset="0"/>
                 <a:cs typeface="Courier New" panose="02070309020205020404" pitchFamily="49" charset="0"/>
               </a:rPr>
               <a:t>ConvoBot</a:t>
             </a:r>
             <a:r>
-              <a:rPr lang="en-US" dirty="0">
+              <a:rPr lang="en-US" sz="1400" dirty="0">
+                <a:solidFill>
+                  <a:srgbClr val="3F115C"/>
+                </a:solidFill>
                 <a:latin typeface="Courier New" panose="02070309020205020404" pitchFamily="49" charset="0"/>
                 <a:cs typeface="Courier New" panose="02070309020205020404" pitchFamily="49" charset="0"/>
               </a:rPr>
               <a:t> extends </a:t>
             </a:r>
             <a:r>
-              <a:rPr lang="en-US" dirty="0" err="1">
+              <a:rPr lang="en-US" sz="1400" dirty="0" err="1">
+                <a:solidFill>
+                  <a:srgbClr val="3F115C"/>
+                </a:solidFill>
                 <a:latin typeface="Courier New" panose="02070309020205020404" pitchFamily="49" charset="0"/>
                 <a:cs typeface="Courier New" panose="02070309020205020404" pitchFamily="49" charset="0"/>
               </a:rPr>
               <a:t>TeamsActivityHandler</a:t>
             </a:r>
             <a:r>
-              <a:rPr lang="en-US" dirty="0">
+              <a:rPr lang="en-US" sz="1400" dirty="0">
+                <a:solidFill>
+                  <a:srgbClr val="3F115C"/>
+                </a:solidFill>
                 <a:latin typeface="Courier New" panose="02070309020205020404" pitchFamily="49" charset="0"/>
                 <a:cs typeface="Courier New" panose="02070309020205020404" pitchFamily="49" charset="0"/>
               </a:rPr>
@@ -11396,7 +11322,10 @@
               <a:buNone/>
             </a:pPr>
             <a:r>
-              <a:rPr lang="en-US" dirty="0">
+              <a:rPr lang="en-US" sz="1400" dirty="0">
+                <a:solidFill>
+                  <a:srgbClr val="3F115C"/>
+                </a:solidFill>
                 <a:latin typeface="Courier New" panose="02070309020205020404" pitchFamily="49" charset="0"/>
                 <a:cs typeface="Courier New" panose="02070309020205020404" pitchFamily="49" charset="0"/>
               </a:rPr>
@@ -11408,7 +11337,10 @@
               <a:buNone/>
             </a:pPr>
             <a:r>
-              <a:rPr lang="en-US" dirty="0">
+              <a:rPr lang="en-US" sz="1400" dirty="0">
+                <a:solidFill>
+                  <a:srgbClr val="3F115C"/>
+                </a:solidFill>
                 <a:latin typeface="Courier New" panose="02070309020205020404" pitchFamily="49" charset="0"/>
                 <a:cs typeface="Courier New" panose="02070309020205020404" pitchFamily="49" charset="0"/>
               </a:rPr>
@@ -11416,7 +11348,10 @@
             </a:r>
           </a:p>
           <a:p>
-            <a:endParaRPr lang="en-US" dirty="0">
+            <a:endParaRPr lang="en-US" sz="1400" dirty="0">
+              <a:solidFill>
+                <a:srgbClr val="3F115C"/>
+              </a:solidFill>
               <a:latin typeface="Courier New" panose="02070309020205020404" pitchFamily="49" charset="0"/>
               <a:cs typeface="Courier New" panose="02070309020205020404" pitchFamily="49" charset="0"/>
             </a:endParaRPr>
@@ -11426,35 +11361,50 @@
               <a:buNone/>
             </a:pPr>
             <a:r>
-              <a:rPr lang="en-US" dirty="0">
+              <a:rPr lang="en-US" sz="1400" dirty="0">
+                <a:solidFill>
+                  <a:srgbClr val="3F115C"/>
+                </a:solidFill>
                 <a:latin typeface="Courier New" panose="02070309020205020404" pitchFamily="49" charset="0"/>
                 <a:cs typeface="Courier New" panose="02070309020205020404" pitchFamily="49" charset="0"/>
               </a:rPr>
               <a:t>    </a:t>
             </a:r>
             <a:r>
-              <a:rPr lang="en-US" dirty="0" err="1">
+              <a:rPr lang="en-US" sz="1400" dirty="0" err="1">
+                <a:solidFill>
+                  <a:srgbClr val="3F115C"/>
+                </a:solidFill>
                 <a:latin typeface="Courier New" panose="02070309020205020404" pitchFamily="49" charset="0"/>
                 <a:cs typeface="Courier New" panose="02070309020205020404" pitchFamily="49" charset="0"/>
               </a:rPr>
               <a:t>this.onReactionsAdded</a:t>
             </a:r>
             <a:r>
-              <a:rPr lang="en-US" dirty="0">
+              <a:rPr lang="en-US" sz="1400" dirty="0">
+                <a:solidFill>
+                  <a:srgbClr val="3F115C"/>
+                </a:solidFill>
                 <a:latin typeface="Courier New" panose="02070309020205020404" pitchFamily="49" charset="0"/>
                 <a:cs typeface="Courier New" panose="02070309020205020404" pitchFamily="49" charset="0"/>
               </a:rPr>
               <a:t>(async (context: </a:t>
             </a:r>
             <a:r>
-              <a:rPr lang="en-US" dirty="0" err="1">
+              <a:rPr lang="en-US" sz="1400" dirty="0" err="1">
+                <a:solidFill>
+                  <a:srgbClr val="3F115C"/>
+                </a:solidFill>
                 <a:latin typeface="Courier New" panose="02070309020205020404" pitchFamily="49" charset="0"/>
                 <a:cs typeface="Courier New" panose="02070309020205020404" pitchFamily="49" charset="0"/>
               </a:rPr>
               <a:t>TurnContext</a:t>
             </a:r>
             <a:r>
-              <a:rPr lang="en-US" dirty="0">
+              <a:rPr lang="en-US" sz="1400" dirty="0">
+                <a:solidFill>
+                  <a:srgbClr val="3F115C"/>
+                </a:solidFill>
                 <a:latin typeface="Courier New" panose="02070309020205020404" pitchFamily="49" charset="0"/>
                 <a:cs typeface="Courier New" panose="02070309020205020404" pitchFamily="49" charset="0"/>
               </a:rPr>
@@ -11466,21 +11416,30 @@
               <a:buNone/>
             </a:pPr>
             <a:r>
-              <a:rPr lang="en-US" dirty="0">
+              <a:rPr lang="en-US" sz="1400" dirty="0">
+                <a:solidFill>
+                  <a:srgbClr val="3F115C"/>
+                </a:solidFill>
                 <a:latin typeface="Courier New" panose="02070309020205020404" pitchFamily="49" charset="0"/>
                 <a:cs typeface="Courier New" panose="02070309020205020404" pitchFamily="49" charset="0"/>
               </a:rPr>
               <a:t>      if (</a:t>
             </a:r>
             <a:r>
-              <a:rPr lang="en-US" dirty="0" err="1">
+              <a:rPr lang="en-US" sz="1400" dirty="0" err="1">
+                <a:solidFill>
+                  <a:srgbClr val="3F115C"/>
+                </a:solidFill>
                 <a:latin typeface="Courier New" panose="02070309020205020404" pitchFamily="49" charset="0"/>
                 <a:cs typeface="Courier New" panose="02070309020205020404" pitchFamily="49" charset="0"/>
               </a:rPr>
               <a:t>context.activity.reactionsAdded</a:t>
             </a:r>
             <a:r>
-              <a:rPr lang="en-US" dirty="0">
+              <a:rPr lang="en-US" sz="1400" dirty="0">
+                <a:solidFill>
+                  <a:srgbClr val="3F115C"/>
+                </a:solidFill>
                 <a:latin typeface="Courier New" panose="02070309020205020404" pitchFamily="49" charset="0"/>
                 <a:cs typeface="Courier New" panose="02070309020205020404" pitchFamily="49" charset="0"/>
               </a:rPr>
@@ -11492,21 +11451,30 @@
               <a:buNone/>
             </a:pPr>
             <a:r>
-              <a:rPr lang="en-US" dirty="0">
+              <a:rPr lang="en-US" sz="1400" dirty="0">
+                <a:solidFill>
+                  <a:srgbClr val="3F115C"/>
+                </a:solidFill>
                 <a:latin typeface="Courier New" panose="02070309020205020404" pitchFamily="49" charset="0"/>
                 <a:cs typeface="Courier New" panose="02070309020205020404" pitchFamily="49" charset="0"/>
               </a:rPr>
               <a:t>        </a:t>
             </a:r>
             <a:r>
-              <a:rPr lang="en-US" dirty="0" err="1">
+              <a:rPr lang="en-US" sz="1400" dirty="0" err="1">
+                <a:solidFill>
+                  <a:srgbClr val="3F115C"/>
+                </a:solidFill>
                 <a:latin typeface="Courier New" panose="02070309020205020404" pitchFamily="49" charset="0"/>
                 <a:cs typeface="Courier New" panose="02070309020205020404" pitchFamily="49" charset="0"/>
               </a:rPr>
               <a:t>context.activity.reactionsAdded.forEach</a:t>
             </a:r>
             <a:r>
-              <a:rPr lang="en-US" dirty="0">
+              <a:rPr lang="en-US" sz="1400" dirty="0">
+                <a:solidFill>
+                  <a:srgbClr val="3F115C"/>
+                </a:solidFill>
                 <a:latin typeface="Courier New" panose="02070309020205020404" pitchFamily="49" charset="0"/>
                 <a:cs typeface="Courier New" panose="02070309020205020404" pitchFamily="49" charset="0"/>
               </a:rPr>
@@ -11518,21 +11486,30 @@
               <a:buNone/>
             </a:pPr>
             <a:r>
-              <a:rPr lang="en-US" dirty="0">
+              <a:rPr lang="en-US" sz="1400" dirty="0">
+                <a:solidFill>
+                  <a:srgbClr val="3F115C"/>
+                </a:solidFill>
                 <a:latin typeface="Courier New" panose="02070309020205020404" pitchFamily="49" charset="0"/>
                 <a:cs typeface="Courier New" panose="02070309020205020404" pitchFamily="49" charset="0"/>
               </a:rPr>
               <a:t>          if (</a:t>
             </a:r>
             <a:r>
-              <a:rPr lang="en-US" dirty="0" err="1">
+              <a:rPr lang="en-US" sz="1400" dirty="0" err="1">
+                <a:solidFill>
+                  <a:srgbClr val="3F115C"/>
+                </a:solidFill>
                 <a:latin typeface="Courier New" panose="02070309020205020404" pitchFamily="49" charset="0"/>
                 <a:cs typeface="Courier New" panose="02070309020205020404" pitchFamily="49" charset="0"/>
               </a:rPr>
               <a:t>reaction.type</a:t>
             </a:r>
             <a:r>
-              <a:rPr lang="en-US" dirty="0">
+              <a:rPr lang="en-US" sz="1400" dirty="0">
+                <a:solidFill>
+                  <a:srgbClr val="3F115C"/>
+                </a:solidFill>
                 <a:latin typeface="Courier New" panose="02070309020205020404" pitchFamily="49" charset="0"/>
                 <a:cs typeface="Courier New" panose="02070309020205020404" pitchFamily="49" charset="0"/>
               </a:rPr>
@@ -11544,21 +11521,30 @@
               <a:buNone/>
             </a:pPr>
             <a:r>
-              <a:rPr lang="en-US" dirty="0">
+              <a:rPr lang="en-US" sz="1400" dirty="0">
+                <a:solidFill>
+                  <a:srgbClr val="3F115C"/>
+                </a:solidFill>
                 <a:latin typeface="Courier New" panose="02070309020205020404" pitchFamily="49" charset="0"/>
                 <a:cs typeface="Courier New" panose="02070309020205020404" pitchFamily="49" charset="0"/>
               </a:rPr>
               <a:t>            await </a:t>
             </a:r>
             <a:r>
-              <a:rPr lang="en-US" dirty="0" err="1">
+              <a:rPr lang="en-US" sz="1400" dirty="0" err="1">
+                <a:solidFill>
+                  <a:srgbClr val="3F115C"/>
+                </a:solidFill>
                 <a:latin typeface="Courier New" panose="02070309020205020404" pitchFamily="49" charset="0"/>
                 <a:cs typeface="Courier New" panose="02070309020205020404" pitchFamily="49" charset="0"/>
               </a:rPr>
               <a:t>context.sendActivity</a:t>
             </a:r>
             <a:r>
-              <a:rPr lang="en-US" dirty="0">
+              <a:rPr lang="en-US" sz="1400" dirty="0">
+                <a:solidFill>
+                  <a:srgbClr val="3F115C"/>
+                </a:solidFill>
                 <a:latin typeface="Courier New" panose="02070309020205020404" pitchFamily="49" charset="0"/>
                 <a:cs typeface="Courier New" panose="02070309020205020404" pitchFamily="49" charset="0"/>
               </a:rPr>
@@ -11570,7 +11556,10 @@
               <a:buNone/>
             </a:pPr>
             <a:r>
-              <a:rPr lang="en-US" dirty="0">
+              <a:rPr lang="en-US" sz="1400" dirty="0">
+                <a:solidFill>
+                  <a:srgbClr val="3F115C"/>
+                </a:solidFill>
                 <a:latin typeface="Courier New" panose="02070309020205020404" pitchFamily="49" charset="0"/>
                 <a:cs typeface="Courier New" panose="02070309020205020404" pitchFamily="49" charset="0"/>
               </a:rPr>
@@ -11582,7 +11571,10 @@
               <a:buNone/>
             </a:pPr>
             <a:r>
-              <a:rPr lang="en-US" dirty="0">
+              <a:rPr lang="en-US" sz="1400" dirty="0">
+                <a:solidFill>
+                  <a:srgbClr val="3F115C"/>
+                </a:solidFill>
                 <a:latin typeface="Courier New" panose="02070309020205020404" pitchFamily="49" charset="0"/>
                 <a:cs typeface="Courier New" panose="02070309020205020404" pitchFamily="49" charset="0"/>
               </a:rPr>
@@ -11594,7 +11586,10 @@
               <a:buNone/>
             </a:pPr>
             <a:r>
-              <a:rPr lang="en-US" dirty="0">
+              <a:rPr lang="en-US" sz="1400" dirty="0">
+                <a:solidFill>
+                  <a:srgbClr val="3F115C"/>
+                </a:solidFill>
                 <a:latin typeface="Courier New" panose="02070309020205020404" pitchFamily="49" charset="0"/>
                 <a:cs typeface="Courier New" panose="02070309020205020404" pitchFamily="49" charset="0"/>
               </a:rPr>
@@ -11606,7 +11601,10 @@
               <a:buNone/>
             </a:pPr>
             <a:r>
-              <a:rPr lang="en-US" dirty="0">
+              <a:rPr lang="en-US" sz="1400" dirty="0">
+                <a:solidFill>
+                  <a:srgbClr val="3F115C"/>
+                </a:solidFill>
                 <a:latin typeface="Courier New" panose="02070309020205020404" pitchFamily="49" charset="0"/>
                 <a:cs typeface="Courier New" panose="02070309020205020404" pitchFamily="49" charset="0"/>
               </a:rPr>
@@ -11618,39 +11616,15 @@
               <a:buNone/>
             </a:pPr>
             <a:r>
-              <a:rPr lang="en-US" dirty="0">
-                <a:latin typeface="Courier New" panose="02070309020205020404" pitchFamily="49" charset="0"/>
-                <a:cs typeface="Courier New" panose="02070309020205020404" pitchFamily="49" charset="0"/>
-              </a:rPr>
-              <a:t>    });</a:t>
-            </a:r>
-          </a:p>
-          <a:p>
-            <a:pPr marL="0" indent="0">
-              <a:buNone/>
-            </a:pPr>
-            <a:r>
-              <a:rPr lang="en-US" dirty="0">
-                <a:latin typeface="Courier New" panose="02070309020205020404" pitchFamily="49" charset="0"/>
-                <a:cs typeface="Courier New" panose="02070309020205020404" pitchFamily="49" charset="0"/>
-              </a:rPr>
-              <a:t>  }</a:t>
-            </a:r>
-          </a:p>
-          <a:p>
-            <a:pPr marL="0" indent="0">
-              <a:buNone/>
-            </a:pPr>
-            <a:r>
-              <a:rPr lang="en-US" dirty="0">
-                <a:latin typeface="Courier New" panose="02070309020205020404" pitchFamily="49" charset="0"/>
-                <a:cs typeface="Courier New" panose="02070309020205020404" pitchFamily="49" charset="0"/>
-              </a:rPr>
-              <a:t>}</a:t>
-            </a:r>
-          </a:p>
-          <a:p>
-            <a:endParaRPr lang="en-US" dirty="0"/>
+              <a:rPr lang="en-US" sz="1400" dirty="0">
+                <a:solidFill>
+                  <a:srgbClr val="3F115C"/>
+                </a:solidFill>
+                <a:latin typeface="Courier New" panose="02070309020205020404" pitchFamily="49" charset="0"/>
+                <a:cs typeface="Courier New" panose="02070309020205020404" pitchFamily="49" charset="0"/>
+              </a:rPr>
+              <a:t>    }); } }</a:t>
+            </a:r>
           </a:p>
         </p:txBody>
       </p:sp>
@@ -11731,7 +11705,7 @@
         <p:spPr/>
         <p:txBody>
           <a:bodyPr>
-            <a:normAutofit fontScale="85000" lnSpcReduction="20000"/>
+            <a:normAutofit/>
           </a:bodyPr>
           <a:lstStyle/>
           <a:p>
@@ -11739,35 +11713,35 @@
               <a:buNone/>
             </a:pPr>
             <a:r>
-              <a:rPr lang="en-US" dirty="0">
+              <a:rPr lang="en-US" sz="2000" dirty="0">
                 <a:latin typeface="Courier New" panose="02070309020205020404" pitchFamily="49" charset="0"/>
                 <a:cs typeface="Courier New" panose="02070309020205020404" pitchFamily="49" charset="0"/>
               </a:rPr>
               <a:t>export class </a:t>
             </a:r>
             <a:r>
-              <a:rPr lang="en-US" dirty="0" err="1">
+              <a:rPr lang="en-US" sz="2000" dirty="0" err="1">
                 <a:latin typeface="Courier New" panose="02070309020205020404" pitchFamily="49" charset="0"/>
                 <a:cs typeface="Courier New" panose="02070309020205020404" pitchFamily="49" charset="0"/>
               </a:rPr>
               <a:t>ConvoBot</a:t>
             </a:r>
             <a:r>
-              <a:rPr lang="en-US" dirty="0">
+              <a:rPr lang="en-US" sz="2000" dirty="0">
                 <a:latin typeface="Courier New" panose="02070309020205020404" pitchFamily="49" charset="0"/>
                 <a:cs typeface="Courier New" panose="02070309020205020404" pitchFamily="49" charset="0"/>
               </a:rPr>
               <a:t> extends </a:t>
             </a:r>
             <a:r>
-              <a:rPr lang="en-US" dirty="0" err="1">
+              <a:rPr lang="en-US" sz="2000" dirty="0" err="1">
                 <a:latin typeface="Courier New" panose="02070309020205020404" pitchFamily="49" charset="0"/>
                 <a:cs typeface="Courier New" panose="02070309020205020404" pitchFamily="49" charset="0"/>
               </a:rPr>
               <a:t>TeamsActivityHandler</a:t>
             </a:r>
             <a:r>
-              <a:rPr lang="en-US" dirty="0">
+              <a:rPr lang="en-US" sz="2000" dirty="0">
                 <a:latin typeface="Courier New" panose="02070309020205020404" pitchFamily="49" charset="0"/>
                 <a:cs typeface="Courier New" panose="02070309020205020404" pitchFamily="49" charset="0"/>
               </a:rPr>
@@ -11779,21 +11753,21 @@
               <a:buNone/>
             </a:pPr>
             <a:r>
-              <a:rPr lang="en-US" dirty="0">
+              <a:rPr lang="en-US" sz="2000" dirty="0">
                 <a:latin typeface="Courier New" panose="02070309020205020404" pitchFamily="49" charset="0"/>
                 <a:cs typeface="Courier New" panose="02070309020205020404" pitchFamily="49" charset="0"/>
               </a:rPr>
               <a:t>  private async </a:t>
             </a:r>
             <a:r>
-              <a:rPr lang="en-US" dirty="0" err="1">
+              <a:rPr lang="en-US" sz="2000" dirty="0" err="1">
                 <a:latin typeface="Courier New" panose="02070309020205020404" pitchFamily="49" charset="0"/>
                 <a:cs typeface="Courier New" panose="02070309020205020404" pitchFamily="49" charset="0"/>
               </a:rPr>
               <a:t>updateCardActivity</a:t>
             </a:r>
             <a:r>
-              <a:rPr lang="en-US" dirty="0">
+              <a:rPr lang="en-US" sz="2000" dirty="0">
                 <a:latin typeface="Courier New" panose="02070309020205020404" pitchFamily="49" charset="0"/>
                 <a:cs typeface="Courier New" panose="02070309020205020404" pitchFamily="49" charset="0"/>
               </a:rPr>
@@ -11805,21 +11779,21 @@
               <a:buNone/>
             </a:pPr>
             <a:r>
-              <a:rPr lang="en-US" dirty="0">
+              <a:rPr lang="en-US" sz="2000" dirty="0">
                 <a:latin typeface="Courier New" panose="02070309020205020404" pitchFamily="49" charset="0"/>
                 <a:cs typeface="Courier New" panose="02070309020205020404" pitchFamily="49" charset="0"/>
               </a:rPr>
               <a:t>    const data = </a:t>
             </a:r>
             <a:r>
-              <a:rPr lang="en-US" dirty="0" err="1">
+              <a:rPr lang="en-US" sz="2000" dirty="0" err="1">
                 <a:latin typeface="Courier New" panose="02070309020205020404" pitchFamily="49" charset="0"/>
                 <a:cs typeface="Courier New" panose="02070309020205020404" pitchFamily="49" charset="0"/>
               </a:rPr>
               <a:t>context.activity.value</a:t>
             </a:r>
             <a:r>
-              <a:rPr lang="en-US" dirty="0">
+              <a:rPr lang="en-US" sz="2000" dirty="0">
                 <a:latin typeface="Courier New" panose="02070309020205020404" pitchFamily="49" charset="0"/>
                 <a:cs typeface="Courier New" panose="02070309020205020404" pitchFamily="49" charset="0"/>
               </a:rPr>
@@ -11831,21 +11805,21 @@
               <a:buNone/>
             </a:pPr>
             <a:r>
-              <a:rPr lang="en-US" dirty="0">
+              <a:rPr lang="en-US" sz="2000" dirty="0">
                 <a:latin typeface="Courier New" panose="02070309020205020404" pitchFamily="49" charset="0"/>
                 <a:cs typeface="Courier New" panose="02070309020205020404" pitchFamily="49" charset="0"/>
               </a:rPr>
               <a:t>    </a:t>
             </a:r>
             <a:r>
-              <a:rPr lang="en-US" dirty="0" err="1">
+              <a:rPr lang="en-US" sz="2000" dirty="0" err="1">
                 <a:latin typeface="Courier New" panose="02070309020205020404" pitchFamily="49" charset="0"/>
                 <a:cs typeface="Courier New" panose="02070309020205020404" pitchFamily="49" charset="0"/>
               </a:rPr>
               <a:t>data.count</a:t>
             </a:r>
             <a:r>
-              <a:rPr lang="en-US" dirty="0">
+              <a:rPr lang="en-US" sz="2000" dirty="0">
                 <a:latin typeface="Courier New" panose="02070309020205020404" pitchFamily="49" charset="0"/>
                 <a:cs typeface="Courier New" panose="02070309020205020404" pitchFamily="49" charset="0"/>
               </a:rPr>
@@ -11857,21 +11831,21 @@
               <a:buNone/>
             </a:pPr>
             <a:r>
-              <a:rPr lang="en-US" dirty="0">
+              <a:rPr lang="en-US" sz="2000" dirty="0">
                 <a:latin typeface="Courier New" panose="02070309020205020404" pitchFamily="49" charset="0"/>
                 <a:cs typeface="Courier New" panose="02070309020205020404" pitchFamily="49" charset="0"/>
               </a:rPr>
               <a:t>    const card = </a:t>
             </a:r>
             <a:r>
-              <a:rPr lang="en-US" dirty="0" err="1">
+              <a:rPr lang="en-US" sz="2000" dirty="0" err="1">
                 <a:latin typeface="Courier New" panose="02070309020205020404" pitchFamily="49" charset="0"/>
                 <a:cs typeface="Courier New" panose="02070309020205020404" pitchFamily="49" charset="0"/>
               </a:rPr>
               <a:t>CardFactory.adaptiveCard</a:t>
             </a:r>
             <a:r>
-              <a:rPr lang="en-US" dirty="0">
+              <a:rPr lang="en-US" sz="2000" dirty="0">
                 <a:latin typeface="Courier New" panose="02070309020205020404" pitchFamily="49" charset="0"/>
                 <a:cs typeface="Courier New" panose="02070309020205020404" pitchFamily="49" charset="0"/>
               </a:rPr>
@@ -11883,21 +11857,21 @@
               <a:buNone/>
             </a:pPr>
             <a:r>
-              <a:rPr lang="en-US" dirty="0">
+              <a:rPr lang="en-US" sz="2000" dirty="0">
                 <a:latin typeface="Courier New" panose="02070309020205020404" pitchFamily="49" charset="0"/>
                 <a:cs typeface="Courier New" panose="02070309020205020404" pitchFamily="49" charset="0"/>
               </a:rPr>
               <a:t>    await </a:t>
             </a:r>
             <a:r>
-              <a:rPr lang="en-US" dirty="0" err="1">
+              <a:rPr lang="en-US" sz="2000" dirty="0" err="1">
                 <a:latin typeface="Courier New" panose="02070309020205020404" pitchFamily="49" charset="0"/>
                 <a:cs typeface="Courier New" panose="02070309020205020404" pitchFamily="49" charset="0"/>
               </a:rPr>
               <a:t>context.updateActivity</a:t>
             </a:r>
             <a:r>
-              <a:rPr lang="en-US" dirty="0">
+              <a:rPr lang="en-US" sz="2000" dirty="0">
                 <a:latin typeface="Courier New" panose="02070309020205020404" pitchFamily="49" charset="0"/>
                 <a:cs typeface="Courier New" panose="02070309020205020404" pitchFamily="49" charset="0"/>
               </a:rPr>
@@ -11909,25 +11883,51 @@
               <a:buNone/>
             </a:pPr>
             <a:r>
-              <a:rPr lang="en-US" dirty="0">
-                <a:latin typeface="Courier New" panose="02070309020205020404" pitchFamily="49" charset="0"/>
-                <a:cs typeface="Courier New" panose="02070309020205020404" pitchFamily="49" charset="0"/>
-              </a:rPr>
-              <a:t>      attachments: [card], id: </a:t>
-            </a:r>
-            <a:r>
-              <a:rPr lang="en-US" dirty="0" err="1">
+              <a:rPr lang="en-US" sz="2000" dirty="0">
+                <a:latin typeface="Courier New" panose="02070309020205020404" pitchFamily="49" charset="0"/>
+                <a:cs typeface="Courier New" panose="02070309020205020404" pitchFamily="49" charset="0"/>
+              </a:rPr>
+              <a:t>      attachments: [card], </a:t>
+            </a:r>
+            <a:br>
+              <a:rPr lang="en-US" sz="2000" dirty="0">
+                <a:latin typeface="Courier New" panose="02070309020205020404" pitchFamily="49" charset="0"/>
+                <a:cs typeface="Courier New" panose="02070309020205020404" pitchFamily="49" charset="0"/>
+              </a:rPr>
+            </a:br>
+            <a:r>
+              <a:rPr lang="en-US" sz="2000" dirty="0">
+                <a:latin typeface="Courier New" panose="02070309020205020404" pitchFamily="49" charset="0"/>
+                <a:cs typeface="Courier New" panose="02070309020205020404" pitchFamily="49" charset="0"/>
+              </a:rPr>
+              <a:t>      id: </a:t>
+            </a:r>
+            <a:r>
+              <a:rPr lang="en-US" sz="2000" dirty="0" err="1">
                 <a:latin typeface="Courier New" panose="02070309020205020404" pitchFamily="49" charset="0"/>
                 <a:cs typeface="Courier New" panose="02070309020205020404" pitchFamily="49" charset="0"/>
               </a:rPr>
               <a:t>context.activity.replyToId</a:t>
             </a:r>
             <a:r>
-              <a:rPr lang="en-US" dirty="0">
-                <a:latin typeface="Courier New" panose="02070309020205020404" pitchFamily="49" charset="0"/>
-                <a:cs typeface="Courier New" panose="02070309020205020404" pitchFamily="49" charset="0"/>
-              </a:rPr>
-              <a:t>, type: 'message' }</a:t>
+              <a:rPr lang="en-US" sz="2000" dirty="0">
+                <a:latin typeface="Courier New" panose="02070309020205020404" pitchFamily="49" charset="0"/>
+                <a:cs typeface="Courier New" panose="02070309020205020404" pitchFamily="49" charset="0"/>
+              </a:rPr>
+              <a:t>, </a:t>
+            </a:r>
+            <a:br>
+              <a:rPr lang="en-US" sz="2000" dirty="0">
+                <a:latin typeface="Courier New" panose="02070309020205020404" pitchFamily="49" charset="0"/>
+                <a:cs typeface="Courier New" panose="02070309020205020404" pitchFamily="49" charset="0"/>
+              </a:rPr>
+            </a:br>
+            <a:r>
+              <a:rPr lang="en-US" sz="2000" dirty="0">
+                <a:latin typeface="Courier New" panose="02070309020205020404" pitchFamily="49" charset="0"/>
+                <a:cs typeface="Courier New" panose="02070309020205020404" pitchFamily="49" charset="0"/>
+              </a:rPr>
+              <a:t>      type: 'message’</a:t>
             </a:r>
           </a:p>
           <a:p>
@@ -11935,11 +11935,11 @@
               <a:buNone/>
             </a:pPr>
             <a:r>
-              <a:rPr lang="en-US" dirty="0">
-                <a:latin typeface="Courier New" panose="02070309020205020404" pitchFamily="49" charset="0"/>
-                <a:cs typeface="Courier New" panose="02070309020205020404" pitchFamily="49" charset="0"/>
-              </a:rPr>
-              <a:t>    );</a:t>
+              <a:rPr lang="en-US" sz="2000" dirty="0">
+                <a:latin typeface="Courier New" panose="02070309020205020404" pitchFamily="49" charset="0"/>
+                <a:cs typeface="Courier New" panose="02070309020205020404" pitchFamily="49" charset="0"/>
+              </a:rPr>
+              <a:t>    });</a:t>
             </a:r>
           </a:p>
           <a:p>
@@ -11947,7 +11947,7 @@
               <a:buNone/>
             </a:pPr>
             <a:r>
-              <a:rPr lang="en-US" dirty="0">
+              <a:rPr lang="en-US" sz="2000" dirty="0">
                 <a:latin typeface="Courier New" panose="02070309020205020404" pitchFamily="49" charset="0"/>
                 <a:cs typeface="Courier New" panose="02070309020205020404" pitchFamily="49" charset="0"/>
               </a:rPr>
@@ -11955,7 +11955,7 @@
             </a:r>
           </a:p>
           <a:p>
-            <a:endParaRPr lang="en-US" dirty="0"/>
+            <a:endParaRPr lang="en-US" sz="2000" dirty="0"/>
           </a:p>
         </p:txBody>
       </p:sp>
@@ -12035,42 +12035,44 @@
         </p:nvSpPr>
         <p:spPr/>
         <p:txBody>
-          <a:bodyPr/>
+          <a:bodyPr>
+            <a:normAutofit/>
+          </a:bodyPr>
           <a:lstStyle/>
           <a:p>
             <a:pPr marL="0" indent="0">
               <a:buNone/>
             </a:pPr>
             <a:r>
-              <a:rPr lang="en-US" dirty="0">
+              <a:rPr lang="en-US" sz="2000" dirty="0">
                 <a:latin typeface="Courier New" panose="02070309020205020404" pitchFamily="49" charset="0"/>
                 <a:cs typeface="Courier New" panose="02070309020205020404" pitchFamily="49" charset="0"/>
               </a:rPr>
               <a:t>export class </a:t>
             </a:r>
             <a:r>
-              <a:rPr lang="en-US" dirty="0" err="1">
+              <a:rPr lang="en-US" sz="2000" dirty="0" err="1">
                 <a:latin typeface="Courier New" panose="02070309020205020404" pitchFamily="49" charset="0"/>
                 <a:cs typeface="Courier New" panose="02070309020205020404" pitchFamily="49" charset="0"/>
               </a:rPr>
               <a:t>ConvoBot</a:t>
             </a:r>
             <a:r>
-              <a:rPr lang="en-US" dirty="0">
+              <a:rPr lang="en-US" sz="2000" dirty="0">
                 <a:latin typeface="Courier New" panose="02070309020205020404" pitchFamily="49" charset="0"/>
                 <a:cs typeface="Courier New" panose="02070309020205020404" pitchFamily="49" charset="0"/>
               </a:rPr>
               <a:t> extends </a:t>
             </a:r>
             <a:r>
-              <a:rPr lang="en-US" dirty="0" err="1">
+              <a:rPr lang="en-US" sz="2000" dirty="0" err="1">
                 <a:latin typeface="Courier New" panose="02070309020205020404" pitchFamily="49" charset="0"/>
                 <a:cs typeface="Courier New" panose="02070309020205020404" pitchFamily="49" charset="0"/>
               </a:rPr>
               <a:t>TeamsActivityHandler</a:t>
             </a:r>
             <a:r>
-              <a:rPr lang="en-US" dirty="0">
+              <a:rPr lang="en-US" sz="2000" dirty="0">
                 <a:latin typeface="Courier New" panose="02070309020205020404" pitchFamily="49" charset="0"/>
                 <a:cs typeface="Courier New" panose="02070309020205020404" pitchFamily="49" charset="0"/>
               </a:rPr>
@@ -12081,100 +12083,118 @@
             <a:pPr marL="0" indent="0">
               <a:buNone/>
             </a:pPr>
-            <a:r>
-              <a:rPr lang="en-US" dirty="0">
-                <a:latin typeface="Courier New" panose="02070309020205020404" pitchFamily="49" charset="0"/>
-                <a:cs typeface="Courier New" panose="02070309020205020404" pitchFamily="49" charset="0"/>
-              </a:rPr>
-              <a:t>  private async </a:t>
-            </a:r>
-            <a:r>
-              <a:rPr lang="en-US" dirty="0" err="1">
-                <a:latin typeface="Courier New" panose="02070309020205020404" pitchFamily="49" charset="0"/>
-                <a:cs typeface="Courier New" panose="02070309020205020404" pitchFamily="49" charset="0"/>
-              </a:rPr>
-              <a:t>deleteCardActivity</a:t>
-            </a:r>
-            <a:r>
-              <a:rPr lang="en-US" dirty="0">
-                <a:latin typeface="Courier New" panose="02070309020205020404" pitchFamily="49" charset="0"/>
-                <a:cs typeface="Courier New" panose="02070309020205020404" pitchFamily="49" charset="0"/>
-              </a:rPr>
-              <a:t>(context): Promise&lt;void&gt; {</a:t>
-            </a:r>
-          </a:p>
-          <a:p>
-            <a:pPr marL="0" indent="0">
-              <a:buNone/>
-            </a:pPr>
-            <a:r>
-              <a:rPr lang="en-US" dirty="0">
-                <a:latin typeface="Courier New" panose="02070309020205020404" pitchFamily="49" charset="0"/>
-                <a:cs typeface="Courier New" panose="02070309020205020404" pitchFamily="49" charset="0"/>
-              </a:rPr>
-              <a:t>    await </a:t>
-            </a:r>
-            <a:r>
-              <a:rPr lang="en-US" dirty="0" err="1">
-                <a:latin typeface="Courier New" panose="02070309020205020404" pitchFamily="49" charset="0"/>
-                <a:cs typeface="Courier New" panose="02070309020205020404" pitchFamily="49" charset="0"/>
-              </a:rPr>
-              <a:t>context.deleteActivity</a:t>
-            </a:r>
-            <a:r>
-              <a:rPr lang="en-US" dirty="0">
-                <a:latin typeface="Courier New" panose="02070309020205020404" pitchFamily="49" charset="0"/>
-                <a:cs typeface="Courier New" panose="02070309020205020404" pitchFamily="49" charset="0"/>
-              </a:rPr>
-              <a:t>(</a:t>
-            </a:r>
-            <a:r>
-              <a:rPr lang="en-US" dirty="0" err="1">
-                <a:latin typeface="Courier New" panose="02070309020205020404" pitchFamily="49" charset="0"/>
-                <a:cs typeface="Courier New" panose="02070309020205020404" pitchFamily="49" charset="0"/>
-              </a:rPr>
-              <a:t>context.activity.replyToId</a:t>
-            </a:r>
-            <a:r>
-              <a:rPr lang="en-US" dirty="0">
-                <a:latin typeface="Courier New" panose="02070309020205020404" pitchFamily="49" charset="0"/>
-                <a:cs typeface="Courier New" panose="02070309020205020404" pitchFamily="49" charset="0"/>
-              </a:rPr>
-              <a:t>);</a:t>
-            </a:r>
-          </a:p>
-          <a:p>
-            <a:pPr marL="0" indent="0">
-              <a:buNone/>
-            </a:pPr>
-            <a:r>
-              <a:rPr lang="en-US" dirty="0">
-                <a:latin typeface="Courier New" panose="02070309020205020404" pitchFamily="49" charset="0"/>
-                <a:cs typeface="Courier New" panose="02070309020205020404" pitchFamily="49" charset="0"/>
-              </a:rPr>
-              <a:t>  }</a:t>
-            </a:r>
-          </a:p>
-          <a:p>
-            <a:pPr marL="0" indent="0">
-              <a:buNone/>
-            </a:pPr>
-            <a:r>
-              <a:rPr lang="en-US" dirty="0">
-                <a:latin typeface="Courier New" panose="02070309020205020404" pitchFamily="49" charset="0"/>
-                <a:cs typeface="Courier New" panose="02070309020205020404" pitchFamily="49" charset="0"/>
-              </a:rPr>
-              <a:t>}</a:t>
-            </a:r>
-          </a:p>
-          <a:p>
-            <a:endParaRPr lang="en-US" dirty="0">
+            <a:endParaRPr lang="en-US" sz="2000" dirty="0">
               <a:latin typeface="Courier New" panose="02070309020205020404" pitchFamily="49" charset="0"/>
               <a:cs typeface="Courier New" panose="02070309020205020404" pitchFamily="49" charset="0"/>
             </a:endParaRPr>
           </a:p>
           <a:p>
-            <a:endParaRPr lang="en-US" dirty="0"/>
+            <a:pPr marL="0" indent="0">
+              <a:buNone/>
+            </a:pPr>
+            <a:r>
+              <a:rPr lang="en-US" sz="2000" dirty="0">
+                <a:latin typeface="Courier New" panose="02070309020205020404" pitchFamily="49" charset="0"/>
+                <a:cs typeface="Courier New" panose="02070309020205020404" pitchFamily="49" charset="0"/>
+              </a:rPr>
+              <a:t>  private async </a:t>
+            </a:r>
+            <a:r>
+              <a:rPr lang="en-US" sz="2000" dirty="0" err="1">
+                <a:latin typeface="Courier New" panose="02070309020205020404" pitchFamily="49" charset="0"/>
+                <a:cs typeface="Courier New" panose="02070309020205020404" pitchFamily="49" charset="0"/>
+              </a:rPr>
+              <a:t>deleteCardActivity</a:t>
+            </a:r>
+            <a:r>
+              <a:rPr lang="en-US" sz="2000" dirty="0">
+                <a:latin typeface="Courier New" panose="02070309020205020404" pitchFamily="49" charset="0"/>
+                <a:cs typeface="Courier New" panose="02070309020205020404" pitchFamily="49" charset="0"/>
+              </a:rPr>
+              <a:t>(context): Promise&lt;void&gt; {</a:t>
+            </a:r>
+          </a:p>
+          <a:p>
+            <a:pPr marL="0" indent="0">
+              <a:buNone/>
+            </a:pPr>
+            <a:r>
+              <a:rPr lang="en-US" sz="2000" dirty="0">
+                <a:latin typeface="Courier New" panose="02070309020205020404" pitchFamily="49" charset="0"/>
+                <a:cs typeface="Courier New" panose="02070309020205020404" pitchFamily="49" charset="0"/>
+              </a:rPr>
+              <a:t>    await </a:t>
+            </a:r>
+            <a:r>
+              <a:rPr lang="en-US" sz="2000" dirty="0" err="1">
+                <a:latin typeface="Courier New" panose="02070309020205020404" pitchFamily="49" charset="0"/>
+                <a:cs typeface="Courier New" panose="02070309020205020404" pitchFamily="49" charset="0"/>
+              </a:rPr>
+              <a:t>context.deleteActivity</a:t>
+            </a:r>
+            <a:r>
+              <a:rPr lang="en-US" sz="2000" dirty="0">
+                <a:latin typeface="Courier New" panose="02070309020205020404" pitchFamily="49" charset="0"/>
+                <a:cs typeface="Courier New" panose="02070309020205020404" pitchFamily="49" charset="0"/>
+              </a:rPr>
+              <a:t>(</a:t>
+            </a:r>
+            <a:r>
+              <a:rPr lang="en-US" sz="2000" dirty="0" err="1">
+                <a:latin typeface="Courier New" panose="02070309020205020404" pitchFamily="49" charset="0"/>
+                <a:cs typeface="Courier New" panose="02070309020205020404" pitchFamily="49" charset="0"/>
+              </a:rPr>
+              <a:t>context.activity.replyToId</a:t>
+            </a:r>
+            <a:r>
+              <a:rPr lang="en-US" sz="2000" dirty="0">
+                <a:latin typeface="Courier New" panose="02070309020205020404" pitchFamily="49" charset="0"/>
+                <a:cs typeface="Courier New" panose="02070309020205020404" pitchFamily="49" charset="0"/>
+              </a:rPr>
+              <a:t>);</a:t>
+            </a:r>
+          </a:p>
+          <a:p>
+            <a:pPr marL="0" indent="0">
+              <a:buNone/>
+            </a:pPr>
+            <a:r>
+              <a:rPr lang="en-US" sz="2000" dirty="0">
+                <a:latin typeface="Courier New" panose="02070309020205020404" pitchFamily="49" charset="0"/>
+                <a:cs typeface="Courier New" panose="02070309020205020404" pitchFamily="49" charset="0"/>
+              </a:rPr>
+              <a:t>  }</a:t>
+            </a:r>
+          </a:p>
+          <a:p>
+            <a:pPr marL="0" indent="0">
+              <a:buNone/>
+            </a:pPr>
+            <a:endParaRPr lang="en-US" sz="2000" dirty="0">
+              <a:latin typeface="Courier New" panose="02070309020205020404" pitchFamily="49" charset="0"/>
+              <a:cs typeface="Courier New" panose="02070309020205020404" pitchFamily="49" charset="0"/>
+            </a:endParaRPr>
+          </a:p>
+          <a:p>
+            <a:pPr marL="0" indent="0">
+              <a:buNone/>
+            </a:pPr>
+            <a:r>
+              <a:rPr lang="en-US" sz="2000" dirty="0">
+                <a:latin typeface="Courier New" panose="02070309020205020404" pitchFamily="49" charset="0"/>
+                <a:cs typeface="Courier New" panose="02070309020205020404" pitchFamily="49" charset="0"/>
+              </a:rPr>
+              <a:t>}</a:t>
+            </a:r>
+          </a:p>
+          <a:p>
+            <a:endParaRPr lang="en-US" sz="2000" dirty="0">
+              <a:latin typeface="Courier New" panose="02070309020205020404" pitchFamily="49" charset="0"/>
+              <a:cs typeface="Courier New" panose="02070309020205020404" pitchFamily="49" charset="0"/>
+            </a:endParaRPr>
+          </a:p>
+          <a:p>
+            <a:endParaRPr lang="en-US" sz="2000" dirty="0"/>
           </a:p>
         </p:txBody>
       </p:sp>
@@ -12674,7 +12694,7 @@
         <p:spPr/>
         <p:txBody>
           <a:bodyPr>
-            <a:normAutofit fontScale="55000" lnSpcReduction="20000"/>
+            <a:normAutofit fontScale="92500" lnSpcReduction="10000"/>
           </a:bodyPr>
           <a:lstStyle/>
           <a:p>
@@ -12682,35 +12702,35 @@
               <a:buNone/>
             </a:pPr>
             <a:r>
-              <a:rPr lang="en-US" dirty="0">
+              <a:rPr lang="en-US" sz="1600" dirty="0">
                 <a:latin typeface="Courier New" panose="02070309020205020404" pitchFamily="49" charset="0"/>
                 <a:cs typeface="Courier New" panose="02070309020205020404" pitchFamily="49" charset="0"/>
               </a:rPr>
               <a:t>export class </a:t>
             </a:r>
             <a:r>
-              <a:rPr lang="en-US" dirty="0" err="1">
+              <a:rPr lang="en-US" sz="1600" dirty="0" err="1">
                 <a:latin typeface="Courier New" panose="02070309020205020404" pitchFamily="49" charset="0"/>
                 <a:cs typeface="Courier New" panose="02070309020205020404" pitchFamily="49" charset="0"/>
               </a:rPr>
               <a:t>ConvoBot</a:t>
             </a:r>
             <a:r>
-              <a:rPr lang="en-US" dirty="0">
+              <a:rPr lang="en-US" sz="1600" dirty="0">
                 <a:latin typeface="Courier New" panose="02070309020205020404" pitchFamily="49" charset="0"/>
                 <a:cs typeface="Courier New" panose="02070309020205020404" pitchFamily="49" charset="0"/>
               </a:rPr>
               <a:t> extends </a:t>
             </a:r>
             <a:r>
-              <a:rPr lang="en-US" dirty="0" err="1">
+              <a:rPr lang="en-US" sz="1600" dirty="0" err="1">
                 <a:latin typeface="Courier New" panose="02070309020205020404" pitchFamily="49" charset="0"/>
                 <a:cs typeface="Courier New" panose="02070309020205020404" pitchFamily="49" charset="0"/>
               </a:rPr>
               <a:t>TeamsActivityHandler</a:t>
             </a:r>
             <a:r>
-              <a:rPr lang="en-US" dirty="0">
+              <a:rPr lang="en-US" sz="1600" dirty="0">
                 <a:latin typeface="Courier New" panose="02070309020205020404" pitchFamily="49" charset="0"/>
                 <a:cs typeface="Courier New" panose="02070309020205020404" pitchFamily="49" charset="0"/>
               </a:rPr>
@@ -12722,7 +12742,7 @@
               <a:buNone/>
             </a:pPr>
             <a:r>
-              <a:rPr lang="en-US" dirty="0">
+              <a:rPr lang="en-US" sz="1600" dirty="0">
                 <a:latin typeface="Courier New" panose="02070309020205020404" pitchFamily="49" charset="0"/>
                 <a:cs typeface="Courier New" panose="02070309020205020404" pitchFamily="49" charset="0"/>
               </a:rPr>
@@ -12734,7 +12754,7 @@
               <a:buNone/>
             </a:pPr>
             <a:r>
-              <a:rPr lang="en-US" dirty="0">
+              <a:rPr lang="en-US" sz="1600" dirty="0">
                 <a:latin typeface="Courier New" panose="02070309020205020404" pitchFamily="49" charset="0"/>
                 <a:cs typeface="Courier New" panose="02070309020205020404" pitchFamily="49" charset="0"/>
               </a:rPr>
@@ -12746,35 +12766,35 @@
               <a:buNone/>
             </a:pPr>
             <a:r>
-              <a:rPr lang="en-US" dirty="0">
+              <a:rPr lang="en-US" sz="1600" dirty="0">
                 <a:latin typeface="Courier New" panose="02070309020205020404" pitchFamily="49" charset="0"/>
                 <a:cs typeface="Courier New" panose="02070309020205020404" pitchFamily="49" charset="0"/>
               </a:rPr>
               <a:t>    </a:t>
             </a:r>
             <a:r>
-              <a:rPr lang="en-US" dirty="0" err="1">
+              <a:rPr lang="en-US" sz="1600" dirty="0" err="1">
                 <a:latin typeface="Courier New" panose="02070309020205020404" pitchFamily="49" charset="0"/>
                 <a:cs typeface="Courier New" panose="02070309020205020404" pitchFamily="49" charset="0"/>
               </a:rPr>
               <a:t>this.onMessage</a:t>
             </a:r>
             <a:r>
-              <a:rPr lang="en-US" dirty="0">
+              <a:rPr lang="en-US" sz="1600" dirty="0">
                 <a:latin typeface="Courier New" panose="02070309020205020404" pitchFamily="49" charset="0"/>
                 <a:cs typeface="Courier New" panose="02070309020205020404" pitchFamily="49" charset="0"/>
               </a:rPr>
               <a:t>(async (context: </a:t>
             </a:r>
             <a:r>
-              <a:rPr lang="en-US" dirty="0" err="1">
+              <a:rPr lang="en-US" sz="1600" dirty="0" err="1">
                 <a:latin typeface="Courier New" panose="02070309020205020404" pitchFamily="49" charset="0"/>
                 <a:cs typeface="Courier New" panose="02070309020205020404" pitchFamily="49" charset="0"/>
               </a:rPr>
               <a:t>TurnContext</a:t>
             </a:r>
             <a:r>
-              <a:rPr lang="en-US" dirty="0">
+              <a:rPr lang="en-US" sz="1600" dirty="0">
                 <a:latin typeface="Courier New" panose="02070309020205020404" pitchFamily="49" charset="0"/>
                 <a:cs typeface="Courier New" panose="02070309020205020404" pitchFamily="49" charset="0"/>
               </a:rPr>
@@ -12786,49 +12806,49 @@
               <a:buNone/>
             </a:pPr>
             <a:r>
-              <a:rPr lang="en-US" dirty="0">
+              <a:rPr lang="en-US" sz="1600" dirty="0">
                 <a:latin typeface="Courier New" panose="02070309020205020404" pitchFamily="49" charset="0"/>
                 <a:cs typeface="Courier New" panose="02070309020205020404" pitchFamily="49" charset="0"/>
               </a:rPr>
               <a:t>      const </a:t>
             </a:r>
             <a:r>
-              <a:rPr lang="en-US" dirty="0" err="1">
+              <a:rPr lang="en-US" sz="1600" dirty="0" err="1">
                 <a:latin typeface="Courier New" panose="02070309020205020404" pitchFamily="49" charset="0"/>
                 <a:cs typeface="Courier New" panose="02070309020205020404" pitchFamily="49" charset="0"/>
               </a:rPr>
               <a:t>botMessageText</a:t>
             </a:r>
             <a:r>
-              <a:rPr lang="en-US" dirty="0">
+              <a:rPr lang="en-US" sz="1600" dirty="0">
                 <a:latin typeface="Courier New" panose="02070309020205020404" pitchFamily="49" charset="0"/>
                 <a:cs typeface="Courier New" panose="02070309020205020404" pitchFamily="49" charset="0"/>
               </a:rPr>
               <a:t>: string = </a:t>
             </a:r>
             <a:r>
-              <a:rPr lang="en-US" dirty="0" err="1">
+              <a:rPr lang="en-US" sz="1600" dirty="0" err="1">
                 <a:latin typeface="Courier New" panose="02070309020205020404" pitchFamily="49" charset="0"/>
                 <a:cs typeface="Courier New" panose="02070309020205020404" pitchFamily="49" charset="0"/>
               </a:rPr>
               <a:t>context.activity.text.trim</a:t>
             </a:r>
             <a:r>
-              <a:rPr lang="en-US" dirty="0">
+              <a:rPr lang="en-US" sz="1600" dirty="0">
                 <a:latin typeface="Courier New" panose="02070309020205020404" pitchFamily="49" charset="0"/>
                 <a:cs typeface="Courier New" panose="02070309020205020404" pitchFamily="49" charset="0"/>
               </a:rPr>
               <a:t>().</a:t>
             </a:r>
             <a:r>
-              <a:rPr lang="en-US" dirty="0" err="1">
+              <a:rPr lang="en-US" sz="1600" dirty="0" err="1">
                 <a:latin typeface="Courier New" panose="02070309020205020404" pitchFamily="49" charset="0"/>
                 <a:cs typeface="Courier New" panose="02070309020205020404" pitchFamily="49" charset="0"/>
               </a:rPr>
               <a:t>toLowerCase</a:t>
             </a:r>
             <a:r>
-              <a:rPr lang="en-US" dirty="0">
+              <a:rPr lang="en-US" sz="1600" dirty="0">
                 <a:latin typeface="Courier New" panose="02070309020205020404" pitchFamily="49" charset="0"/>
                 <a:cs typeface="Courier New" panose="02070309020205020404" pitchFamily="49" charset="0"/>
               </a:rPr>
@@ -12840,35 +12860,35 @@
               <a:buNone/>
             </a:pPr>
             <a:r>
-              <a:rPr lang="en-US" dirty="0">
+              <a:rPr lang="en-US" sz="1600" dirty="0">
                 <a:latin typeface="Courier New" panose="02070309020205020404" pitchFamily="49" charset="0"/>
                 <a:cs typeface="Courier New" panose="02070309020205020404" pitchFamily="49" charset="0"/>
               </a:rPr>
               <a:t>      if (</a:t>
             </a:r>
             <a:r>
-              <a:rPr lang="en-US" dirty="0" err="1">
+              <a:rPr lang="en-US" sz="1600" dirty="0" err="1">
                 <a:latin typeface="Courier New" panose="02070309020205020404" pitchFamily="49" charset="0"/>
                 <a:cs typeface="Courier New" panose="02070309020205020404" pitchFamily="49" charset="0"/>
               </a:rPr>
               <a:t>botMessageText.endsWith</a:t>
             </a:r>
             <a:r>
-              <a:rPr lang="en-US" dirty="0">
+              <a:rPr lang="en-US" sz="1600" dirty="0">
                 <a:latin typeface="Courier New" panose="02070309020205020404" pitchFamily="49" charset="0"/>
                 <a:cs typeface="Courier New" panose="02070309020205020404" pitchFamily="49" charset="0"/>
               </a:rPr>
               <a:t>("</a:t>
             </a:r>
             <a:r>
-              <a:rPr lang="en-US" dirty="0" err="1">
+              <a:rPr lang="en-US" sz="1600" dirty="0" err="1">
                 <a:latin typeface="Courier New" panose="02070309020205020404" pitchFamily="49" charset="0"/>
                 <a:cs typeface="Courier New" panose="02070309020205020404" pitchFamily="49" charset="0"/>
               </a:rPr>
               <a:t>newconversation</a:t>
             </a:r>
             <a:r>
-              <a:rPr lang="en-US" dirty="0">
+              <a:rPr lang="en-US" sz="1600" dirty="0">
                 <a:latin typeface="Courier New" panose="02070309020205020404" pitchFamily="49" charset="0"/>
                 <a:cs typeface="Courier New" panose="02070309020205020404" pitchFamily="49" charset="0"/>
               </a:rPr>
@@ -12880,21 +12900,21 @@
               <a:buNone/>
             </a:pPr>
             <a:r>
-              <a:rPr lang="en-US" dirty="0">
+              <a:rPr lang="en-US" sz="1600" dirty="0">
                 <a:latin typeface="Courier New" panose="02070309020205020404" pitchFamily="49" charset="0"/>
                 <a:cs typeface="Courier New" panose="02070309020205020404" pitchFamily="49" charset="0"/>
               </a:rPr>
               <a:t>        const message = </a:t>
             </a:r>
             <a:r>
-              <a:rPr lang="en-US" dirty="0" err="1">
+              <a:rPr lang="en-US" sz="1600" dirty="0" err="1">
                 <a:latin typeface="Courier New" panose="02070309020205020404" pitchFamily="49" charset="0"/>
                 <a:cs typeface="Courier New" panose="02070309020205020404" pitchFamily="49" charset="0"/>
               </a:rPr>
               <a:t>MessageFactory.text</a:t>
             </a:r>
             <a:r>
-              <a:rPr lang="en-US" dirty="0">
+              <a:rPr lang="en-US" sz="1600" dirty="0">
                 <a:latin typeface="Courier New" panose="02070309020205020404" pitchFamily="49" charset="0"/>
                 <a:cs typeface="Courier New" panose="02070309020205020404" pitchFamily="49" charset="0"/>
               </a:rPr>
@@ -12906,21 +12926,21 @@
               <a:buNone/>
             </a:pPr>
             <a:r>
-              <a:rPr lang="en-US" dirty="0">
+              <a:rPr lang="en-US" sz="1600" dirty="0">
                 <a:latin typeface="Courier New" panose="02070309020205020404" pitchFamily="49" charset="0"/>
                 <a:cs typeface="Courier New" panose="02070309020205020404" pitchFamily="49" charset="0"/>
               </a:rPr>
               <a:t>	await </a:t>
             </a:r>
             <a:r>
-              <a:rPr lang="en-US" dirty="0" err="1">
+              <a:rPr lang="en-US" sz="1600" dirty="0" err="1">
                 <a:latin typeface="Courier New" panose="02070309020205020404" pitchFamily="49" charset="0"/>
                 <a:cs typeface="Courier New" panose="02070309020205020404" pitchFamily="49" charset="0"/>
               </a:rPr>
               <a:t>this.createConversationInChannel</a:t>
             </a:r>
             <a:r>
-              <a:rPr lang="en-US" dirty="0">
+              <a:rPr lang="en-US" sz="1600" dirty="0">
                 <a:latin typeface="Courier New" panose="02070309020205020404" pitchFamily="49" charset="0"/>
                 <a:cs typeface="Courier New" panose="02070309020205020404" pitchFamily="49" charset="0"/>
               </a:rPr>
@@ -12932,7 +12952,7 @@
               <a:buNone/>
             </a:pPr>
             <a:r>
-              <a:rPr lang="en-US" dirty="0">
+              <a:rPr lang="en-US" sz="1600" dirty="0">
                 <a:latin typeface="Courier New" panose="02070309020205020404" pitchFamily="49" charset="0"/>
                 <a:cs typeface="Courier New" panose="02070309020205020404" pitchFamily="49" charset="0"/>
               </a:rPr>
@@ -12944,7 +12964,7 @@
               <a:buNone/>
             </a:pPr>
             <a:r>
-              <a:rPr lang="en-US" dirty="0">
+              <a:rPr lang="en-US" sz="1600" dirty="0">
                 <a:latin typeface="Courier New" panose="02070309020205020404" pitchFamily="49" charset="0"/>
                 <a:cs typeface="Courier New" panose="02070309020205020404" pitchFamily="49" charset="0"/>
               </a:rPr>
@@ -12956,7 +12976,7 @@
               <a:buNone/>
             </a:pPr>
             <a:r>
-              <a:rPr lang="en-US" dirty="0">
+              <a:rPr lang="en-US" sz="1600" dirty="0">
                 <a:latin typeface="Courier New" panose="02070309020205020404" pitchFamily="49" charset="0"/>
                 <a:cs typeface="Courier New" panose="02070309020205020404" pitchFamily="49" charset="0"/>
               </a:rPr>
@@ -12968,7 +12988,7 @@
               <a:buNone/>
             </a:pPr>
             <a:r>
-              <a:rPr lang="en-US" dirty="0">
+              <a:rPr lang="en-US" sz="1600" dirty="0">
                 <a:latin typeface="Courier New" panose="02070309020205020404" pitchFamily="49" charset="0"/>
                 <a:cs typeface="Courier New" panose="02070309020205020404" pitchFamily="49" charset="0"/>
               </a:rPr>
@@ -12980,7 +13000,7 @@
               <a:buNone/>
             </a:pPr>
             <a:r>
-              <a:rPr lang="en-US" dirty="0">
+              <a:rPr lang="en-US" sz="1600" dirty="0">
                 <a:latin typeface="Courier New" panose="02070309020205020404" pitchFamily="49" charset="0"/>
                 <a:cs typeface="Courier New" panose="02070309020205020404" pitchFamily="49" charset="0"/>
               </a:rPr>
@@ -12988,7 +13008,7 @@
             </a:r>
           </a:p>
           <a:p>
-            <a:endParaRPr lang="en-US" dirty="0"/>
+            <a:endParaRPr lang="en-US" sz="1600" dirty="0"/>
           </a:p>
         </p:txBody>
       </p:sp>
@@ -13741,7 +13761,14 @@
             </a:pPr>
             <a:r>
               <a:rPr lang="en-US" i="1" dirty="0"/>
-              <a:t>Additional messages can be retrieved by the bot using Microsoft Graph &amp; additional permissions</a:t>
+              <a:t>Additional messages can be retrieved by the bot using Microsoft Graph </a:t>
+            </a:r>
+            <a:br>
+              <a:rPr lang="en-US" i="1" dirty="0"/>
+            </a:br>
+            <a:r>
+              <a:rPr lang="en-US" i="1" dirty="0"/>
+              <a:t>&amp; additional permissions</a:t>
             </a:r>
           </a:p>
           <a:p>
@@ -14304,7 +14331,14 @@
             </a:pPr>
             <a:r>
               <a:rPr lang="en-US" dirty="0"/>
-              <a:t>Bots created with the Microsoft Bot Framework are diverse &amp; can be used in multiple channels</a:t>
+              <a:t>Bots created with the Microsoft Bot Framework are diverse &amp; can </a:t>
+            </a:r>
+            <a:br>
+              <a:rPr lang="en-US" dirty="0"/>
+            </a:br>
+            <a:r>
+              <a:rPr lang="en-US" dirty="0"/>
+              <a:t>be used in multiple channels</a:t>
             </a:r>
           </a:p>
           <a:p>
@@ -14362,7 +14396,14 @@
             </a:pPr>
             <a:r>
               <a:rPr lang="en-US" dirty="0"/>
-              <a:t>Routes all Teams activities before allowing any non-Teams-specific activity to be handled</a:t>
+              <a:t>Routes all Teams activities before allowing any non-Teams-specific </a:t>
+            </a:r>
+            <a:br>
+              <a:rPr lang="en-US" dirty="0"/>
+            </a:br>
+            <a:r>
+              <a:rPr lang="en-US" dirty="0"/>
+              <a:t>activity to be handled</a:t>
             </a:r>
           </a:p>
           <a:p>
@@ -15175,6 +15216,23 @@
 </file>
 
 <file path=customXml/item1.xml><?xml version="1.0" encoding="utf-8"?>
+<?mso-contentType ?>
+<FormTemplates xmlns="http://schemas.microsoft.com/sharepoint/v3/contenttype/forms">
+  <Display>DocumentLibraryForm</Display>
+  <Edit>DocumentLibraryForm</Edit>
+  <New>DocumentLibraryForm</New>
+</FormTemplates>
+</file>
+
+<file path=customXml/item2.xml><?xml version="1.0" encoding="utf-8"?>
+<p:properties xmlns:p="http://schemas.microsoft.com/office/2006/metadata/properties" xmlns:xsi="http://www.w3.org/2001/XMLSchema-instance" xmlns:pc="http://schemas.microsoft.com/office/infopath/2007/PartnerControls">
+  <documentManagement>
+    <MediaServiceKeyPoints xmlns="61b79488-63fd-46f4-b1bf-09cb63d2085e" xsi:nil="true"/>
+  </documentManagement>
+</p:properties>
+</file>
+
+<file path=customXml/item3.xml><?xml version="1.0" encoding="utf-8"?>
 <ct:contentTypeSchema xmlns:ct="http://schemas.microsoft.com/office/2006/metadata/contentType" xmlns:ma="http://schemas.microsoft.com/office/2006/metadata/properties/metaAttributes" ct:_="" ma:_="" ma:contentTypeName="Document" ma:contentTypeID="0x010100F09820594E7B0041BAC4DECBBC892FF9" ma:contentTypeVersion="8" ma:contentTypeDescription="Create a new document." ma:contentTypeScope="" ma:versionID="a4814d1cc1d58eee3ea03778ca413c81">
   <xsd:schema xmlns:xsd="http://www.w3.org/2001/XMLSchema" xmlns:xs="http://www.w3.org/2001/XMLSchema" xmlns:p="http://schemas.microsoft.com/office/2006/metadata/properties" xmlns:ns2="61b79488-63fd-46f4-b1bf-09cb63d2085e" targetNamespace="http://schemas.microsoft.com/office/2006/metadata/properties" ma:root="true" ma:fieldsID="40fb5444c5ccb72d5b900b723022c04a" ns2:_="">
     <xsd:import namespace="61b79488-63fd-46f4-b1bf-09cb63d2085e"/>
@@ -15346,37 +15404,10 @@
 </ct:contentTypeSchema>
 </file>
 
-<file path=customXml/item2.xml><?xml version="1.0" encoding="utf-8"?>
-<p:properties xmlns:p="http://schemas.microsoft.com/office/2006/metadata/properties" xmlns:xsi="http://www.w3.org/2001/XMLSchema-instance" xmlns:pc="http://schemas.microsoft.com/office/infopath/2007/PartnerControls">
-  <documentManagement>
-    <MediaServiceKeyPoints xmlns="61b79488-63fd-46f4-b1bf-09cb63d2085e" xsi:nil="true"/>
-  </documentManagement>
-</p:properties>
-</file>
-
-<file path=customXml/item3.xml><?xml version="1.0" encoding="utf-8"?>
-<?mso-contentType ?>
-<FormTemplates xmlns="http://schemas.microsoft.com/sharepoint/v3/contenttype/forms">
-  <Display>DocumentLibraryForm</Display>
-  <Edit>DocumentLibraryForm</Edit>
-  <New>DocumentLibraryForm</New>
-</FormTemplates>
-</file>
-
 <file path=customXml/itemProps1.xml><?xml version="1.0" encoding="utf-8"?>
-<ds:datastoreItem xmlns:ds="http://schemas.openxmlformats.org/officeDocument/2006/customXml" ds:itemID="{535C360C-FC5A-43F7-BF1D-FA69DEF501D3}">
+<ds:datastoreItem xmlns:ds="http://schemas.openxmlformats.org/officeDocument/2006/customXml" ds:itemID="{4875BE8C-CB08-400E-A21F-2497FF16C77B}">
   <ds:schemaRefs>
-    <ds:schemaRef ds:uri="http://schemas.microsoft.com/office/2006/metadata/contentType"/>
-    <ds:schemaRef ds:uri="http://schemas.microsoft.com/office/2006/metadata/properties/metaAttributes"/>
-    <ds:schemaRef ds:uri="http://www.w3.org/2001/XMLSchema"/>
-    <ds:schemaRef ds:uri="http://schemas.microsoft.com/office/2006/metadata/properties"/>
-    <ds:schemaRef ds:uri="61b79488-63fd-46f4-b1bf-09cb63d2085e"/>
-    <ds:schemaRef ds:uri="http://schemas.microsoft.com/office/2006/documentManagement/types"/>
-    <ds:schemaRef ds:uri="http://schemas.microsoft.com/office/infopath/2007/PartnerControls"/>
-    <ds:schemaRef ds:uri="http://schemas.openxmlformats.org/package/2006/metadata/core-properties"/>
-    <ds:schemaRef ds:uri="http://purl.org/dc/elements/1.1/"/>
-    <ds:schemaRef ds:uri="http://purl.org/dc/terms/"/>
-    <ds:schemaRef ds:uri="http://schemas.microsoft.com/internal/obd"/>
+    <ds:schemaRef ds:uri="http://schemas.microsoft.com/sharepoint/v3/contenttype/forms"/>
   </ds:schemaRefs>
 </ds:datastoreItem>
 </file>
@@ -15398,9 +15429,19 @@
 </file>
 
 <file path=customXml/itemProps3.xml><?xml version="1.0" encoding="utf-8"?>
-<ds:datastoreItem xmlns:ds="http://schemas.openxmlformats.org/officeDocument/2006/customXml" ds:itemID="{4875BE8C-CB08-400E-A21F-2497FF16C77B}">
+<ds:datastoreItem xmlns:ds="http://schemas.openxmlformats.org/officeDocument/2006/customXml" ds:itemID="{535C360C-FC5A-43F7-BF1D-FA69DEF501D3}">
   <ds:schemaRefs>
-    <ds:schemaRef ds:uri="http://schemas.microsoft.com/sharepoint/v3/contenttype/forms"/>
+    <ds:schemaRef ds:uri="http://schemas.microsoft.com/office/2006/metadata/contentType"/>
+    <ds:schemaRef ds:uri="http://schemas.microsoft.com/office/2006/metadata/properties/metaAttributes"/>
+    <ds:schemaRef ds:uri="http://www.w3.org/2001/XMLSchema"/>
+    <ds:schemaRef ds:uri="http://schemas.microsoft.com/office/2006/metadata/properties"/>
+    <ds:schemaRef ds:uri="61b79488-63fd-46f4-b1bf-09cb63d2085e"/>
+    <ds:schemaRef ds:uri="http://schemas.microsoft.com/office/2006/documentManagement/types"/>
+    <ds:schemaRef ds:uri="http://schemas.microsoft.com/office/infopath/2007/PartnerControls"/>
+    <ds:schemaRef ds:uri="http://schemas.openxmlformats.org/package/2006/metadata/core-properties"/>
+    <ds:schemaRef ds:uri="http://purl.org/dc/elements/1.1/"/>
+    <ds:schemaRef ds:uri="http://purl.org/dc/terms/"/>
+    <ds:schemaRef ds:uri="http://schemas.microsoft.com/internal/obd"/>
   </ds:schemaRefs>
 </ds:datastoreItem>
 </file>

</xml_diff>

<commit_message>
FY23Q3 refresh - msteams-conversation-bots
- run through all exercise steps in associated MSLearn module to validate good working order
- updated steps & fixed typos where necessary
- updated slides where necessary
- update code samples to reflect MSLearn HOL exercise refresh & updates
- any & all users/names/company names/pictures/IDs are not real people/tenants... all are from M365 demo tenants provided by Microsoft
</commit_message>
<xml_diff>
--- a/Teams/40 Conversational Bots/slides.pptx
+++ b/Teams/40 Conversational Bots/slides.pptx
@@ -308,7 +308,7 @@
           <a:p>
             <a:fld id="{F5D67128-0ED3-F84C-AB75-26956BD6F773}" type="datetimeFigureOut">
               <a:rPr lang="en-US" smtClean="0"/>
-              <a:t>12/2/22</a:t>
+              <a:t>12/7/22</a:t>
             </a:fld>
             <a:endParaRPr lang="en-US"/>
           </a:p>
@@ -485,7 +485,7 @@
           <a:p>
             <a:fld id="{9E65F564-29A8-0243-B41B-CCCF740F82F1}" type="datetimeFigureOut">
               <a:rPr lang="en-US" smtClean="0"/>
-              <a:t>12/2/22</a:t>
+              <a:t>12/7/22</a:t>
             </a:fld>
             <a:endParaRPr lang="en-US"/>
           </a:p>
@@ -10214,6 +10214,9 @@
           <a:p>
             <a:r>
               <a:rPr lang="en-US" sz="1800" dirty="0">
+                <a:solidFill>
+                  <a:srgbClr val="3F115C"/>
+                </a:solidFill>
                 <a:latin typeface="+mj-lt"/>
               </a:rPr>
               <a:t>Team Member Events</a:t>
@@ -10228,11 +10231,17 @@
             </a:pPr>
             <a:r>
               <a:rPr lang="en-US" dirty="0" err="1">
+                <a:solidFill>
+                  <a:srgbClr val="3F115C"/>
+                </a:solidFill>
                 <a:latin typeface="Consolas" panose="020B0609020204030204" pitchFamily="49" charset="0"/>
               </a:rPr>
               <a:t>teamMemberAdded</a:t>
             </a:r>
             <a:endParaRPr lang="en-US" dirty="0">
+              <a:solidFill>
+                <a:srgbClr val="3F115C"/>
+              </a:solidFill>
               <a:latin typeface="Consolas" panose="020B0609020204030204" pitchFamily="49" charset="0"/>
             </a:endParaRPr>
           </a:p>
@@ -10245,11 +10254,17 @@
             </a:pPr>
             <a:r>
               <a:rPr lang="en-US" dirty="0" err="1">
+                <a:solidFill>
+                  <a:srgbClr val="3F115C"/>
+                </a:solidFill>
                 <a:latin typeface="Consolas" panose="020B0609020204030204" pitchFamily="49" charset="0"/>
               </a:rPr>
               <a:t>teamMemberRemoved</a:t>
             </a:r>
             <a:endParaRPr lang="en-US" dirty="0">
+              <a:solidFill>
+                <a:srgbClr val="3F115C"/>
+              </a:solidFill>
               <a:latin typeface="Consolas" panose="020B0609020204030204" pitchFamily="49" charset="0"/>
             </a:endParaRPr>
           </a:p>
@@ -10261,14 +10276,26 @@
               <a:buNone/>
             </a:pPr>
             <a:r>
-              <a:rPr lang="en-US" dirty="0"/>
+              <a:rPr lang="en-US" dirty="0">
+                <a:solidFill>
+                  <a:srgbClr val="3F115C"/>
+                </a:solidFill>
+              </a:rPr>
               <a:t>Payload object contains </a:t>
             </a:r>
             <a:br>
-              <a:rPr lang="en-US" dirty="0"/>
+              <a:rPr lang="en-US" dirty="0">
+                <a:solidFill>
+                  <a:srgbClr val="3F115C"/>
+                </a:solidFill>
+              </a:rPr>
             </a:br>
             <a:r>
-              <a:rPr lang="en-US" dirty="0"/>
+              <a:rPr lang="en-US" dirty="0">
+                <a:solidFill>
+                  <a:srgbClr val="3F115C"/>
+                </a:solidFill>
+              </a:rPr>
               <a:t>added/removed members</a:t>
             </a:r>
           </a:p>
@@ -10281,6 +10308,9 @@
             </a:pPr>
             <a:r>
               <a:rPr lang="en-US" dirty="0">
+                <a:solidFill>
+                  <a:srgbClr val="3F115C"/>
+                </a:solidFill>
                 <a:latin typeface="+mj-lt"/>
               </a:rPr>
               <a:t>*Adding bot fires this event</a:t>
@@ -10524,6 +10554,9 @@
           <a:p>
             <a:r>
               <a:rPr lang="en-US" sz="1800" dirty="0">
+                <a:solidFill>
+                  <a:srgbClr val="3F115C"/>
+                </a:solidFill>
                 <a:latin typeface="+mj-lt"/>
               </a:rPr>
               <a:t>Channel Events</a:t>
@@ -10533,7 +10566,7 @@
             <a:r>
               <a:rPr lang="en-US" b="0" dirty="0" err="1">
                 <a:solidFill>
-                  <a:schemeClr val="tx1"/>
+                  <a:srgbClr val="3F115C"/>
                 </a:solidFill>
                 <a:latin typeface="Consolas" panose="020B0609020204030204" pitchFamily="49" charset="0"/>
               </a:rPr>
@@ -10541,7 +10574,7 @@
             </a:r>
             <a:endParaRPr lang="en-US" b="0" dirty="0">
               <a:solidFill>
-                <a:schemeClr val="tx1"/>
+                <a:srgbClr val="3F115C"/>
               </a:solidFill>
               <a:latin typeface="Consolas" panose="020B0609020204030204" pitchFamily="49" charset="0"/>
             </a:endParaRPr>
@@ -10550,7 +10583,7 @@
             <a:r>
               <a:rPr lang="en-US" b="0" dirty="0" err="1">
                 <a:solidFill>
-                  <a:schemeClr val="tx1"/>
+                  <a:srgbClr val="3F115C"/>
                 </a:solidFill>
                 <a:latin typeface="Consolas" panose="020B0609020204030204" pitchFamily="49" charset="0"/>
               </a:rPr>
@@ -10558,7 +10591,7 @@
             </a:r>
             <a:endParaRPr lang="en-US" b="0" dirty="0">
               <a:solidFill>
-                <a:schemeClr val="tx1"/>
+                <a:srgbClr val="3F115C"/>
               </a:solidFill>
               <a:latin typeface="Consolas" panose="020B0609020204030204" pitchFamily="49" charset="0"/>
             </a:endParaRPr>
@@ -10567,7 +10600,7 @@
             <a:r>
               <a:rPr lang="en-US" b="0" dirty="0" err="1">
                 <a:solidFill>
-                  <a:schemeClr val="tx1"/>
+                  <a:srgbClr val="3F115C"/>
                 </a:solidFill>
                 <a:latin typeface="Consolas" panose="020B0609020204030204" pitchFamily="49" charset="0"/>
               </a:rPr>
@@ -10575,7 +10608,7 @@
             </a:r>
             <a:endParaRPr lang="en-US" b="0" dirty="0">
               <a:solidFill>
-                <a:schemeClr val="tx1"/>
+                <a:srgbClr val="3F115C"/>
               </a:solidFill>
               <a:latin typeface="Consolas" panose="020B0609020204030204" pitchFamily="49" charset="0"/>
             </a:endParaRPr>
@@ -10584,7 +10617,7 @@
             <a:r>
               <a:rPr lang="en-US" b="0" dirty="0" err="1">
                 <a:solidFill>
-                  <a:schemeClr val="tx1"/>
+                  <a:srgbClr val="3F115C"/>
                 </a:solidFill>
                 <a:latin typeface="Consolas" panose="020B0609020204030204" pitchFamily="49" charset="0"/>
                 <a:cs typeface="Consolas" panose="020B0609020204030204" pitchFamily="49" charset="0"/>
@@ -10594,7 +10627,7 @@
             <a:r>
               <a:rPr lang="en-US" dirty="0">
                 <a:solidFill>
-                  <a:schemeClr val="tx1"/>
+                  <a:srgbClr val="3F115C"/>
                 </a:solidFill>
                 <a:latin typeface="+mj-lt"/>
               </a:rPr>
@@ -10839,6 +10872,9 @@
           <a:p>
             <a:r>
               <a:rPr lang="en-US" sz="1800" dirty="0">
+                <a:solidFill>
+                  <a:srgbClr val="3F115C"/>
+                </a:solidFill>
                 <a:latin typeface="+mj-lt"/>
               </a:rPr>
               <a:t>Reactions</a:t>
@@ -10848,7 +10884,7 @@
             <a:r>
               <a:rPr lang="en-US" b="0" dirty="0" err="1">
                 <a:solidFill>
-                  <a:schemeClr val="tx1"/>
+                  <a:srgbClr val="3F115C"/>
                 </a:solidFill>
                 <a:latin typeface="Consolas" panose="020B0609020204030204" pitchFamily="49" charset="0"/>
               </a:rPr>
@@ -10856,7 +10892,7 @@
             </a:r>
             <a:endParaRPr lang="en-US" b="0" dirty="0">
               <a:solidFill>
-                <a:schemeClr val="tx1"/>
+                <a:srgbClr val="3F115C"/>
               </a:solidFill>
               <a:latin typeface="Consolas" panose="020B0609020204030204" pitchFamily="49" charset="0"/>
             </a:endParaRPr>
@@ -10865,7 +10901,7 @@
             <a:r>
               <a:rPr lang="en-US" b="0" dirty="0" err="1">
                 <a:solidFill>
-                  <a:schemeClr val="tx1"/>
+                  <a:srgbClr val="3F115C"/>
                 </a:solidFill>
                 <a:latin typeface="Consolas" panose="020B0609020204030204" pitchFamily="49" charset="0"/>
               </a:rPr>
@@ -10873,7 +10909,7 @@
             </a:r>
             <a:endParaRPr lang="en-US" b="0" dirty="0">
               <a:solidFill>
-                <a:schemeClr val="tx1"/>
+                <a:srgbClr val="3F115C"/>
               </a:solidFill>
               <a:latin typeface="Consolas" panose="020B0609020204030204" pitchFamily="49" charset="0"/>
             </a:endParaRPr>
@@ -10882,7 +10918,7 @@
             <a:r>
               <a:rPr lang="en-US" b="0" dirty="0" err="1">
                 <a:solidFill>
-                  <a:schemeClr val="tx1"/>
+                  <a:srgbClr val="3F115C"/>
                 </a:solidFill>
                 <a:latin typeface="Consolas" panose="020B0609020204030204" pitchFamily="49" charset="0"/>
                 <a:cs typeface="Consolas" panose="020B0609020204030204" pitchFamily="49" charset="0"/>
@@ -10892,7 +10928,7 @@
             <a:r>
               <a:rPr lang="en-US" dirty="0">
                 <a:solidFill>
-                  <a:schemeClr val="tx1"/>
+                  <a:srgbClr val="3F115C"/>
                 </a:solidFill>
                 <a:latin typeface="+mj-lt"/>
               </a:rPr>
@@ -11137,6 +11173,9 @@
           <a:p>
             <a:r>
               <a:rPr lang="en-US" sz="1800" dirty="0">
+                <a:solidFill>
+                  <a:srgbClr val="3F115C"/>
+                </a:solidFill>
                 <a:latin typeface="+mj-lt"/>
               </a:rPr>
               <a:t>Team Events</a:t>
@@ -11146,7 +11185,7 @@
             <a:r>
               <a:rPr lang="en-US" b="0" dirty="0" err="1">
                 <a:solidFill>
-                  <a:schemeClr val="tx1"/>
+                  <a:srgbClr val="3F115C"/>
                 </a:solidFill>
                 <a:latin typeface="Consolas" panose="020B0609020204030204" pitchFamily="49" charset="0"/>
               </a:rPr>
@@ -11154,7 +11193,7 @@
             </a:r>
             <a:endParaRPr lang="en-US" b="0" dirty="0">
               <a:solidFill>
-                <a:schemeClr val="tx1"/>
+                <a:srgbClr val="3F115C"/>
               </a:solidFill>
               <a:latin typeface="Consolas" panose="020B0609020204030204" pitchFamily="49" charset="0"/>
             </a:endParaRPr>
@@ -11163,7 +11202,7 @@
             <a:r>
               <a:rPr lang="en-US" b="0" dirty="0" err="1">
                 <a:solidFill>
-                  <a:schemeClr val="tx1"/>
+                  <a:srgbClr val="3F115C"/>
                 </a:solidFill>
                 <a:latin typeface="Consolas" panose="020B0609020204030204" pitchFamily="49" charset="0"/>
                 <a:cs typeface="Consolas" panose="020B0609020204030204" pitchFamily="49" charset="0"/>
@@ -11173,7 +11212,7 @@
             <a:r>
               <a:rPr lang="en-US" dirty="0">
                 <a:solidFill>
-                  <a:schemeClr val="tx1"/>
+                  <a:srgbClr val="3F115C"/>
                 </a:solidFill>
                 <a:latin typeface="+mj-lt"/>
               </a:rPr>
@@ -15216,23 +15255,6 @@
 </file>
 
 <file path=customXml/item1.xml><?xml version="1.0" encoding="utf-8"?>
-<?mso-contentType ?>
-<FormTemplates xmlns="http://schemas.microsoft.com/sharepoint/v3/contenttype/forms">
-  <Display>DocumentLibraryForm</Display>
-  <Edit>DocumentLibraryForm</Edit>
-  <New>DocumentLibraryForm</New>
-</FormTemplates>
-</file>
-
-<file path=customXml/item2.xml><?xml version="1.0" encoding="utf-8"?>
-<p:properties xmlns:p="http://schemas.microsoft.com/office/2006/metadata/properties" xmlns:xsi="http://www.w3.org/2001/XMLSchema-instance" xmlns:pc="http://schemas.microsoft.com/office/infopath/2007/PartnerControls">
-  <documentManagement>
-    <MediaServiceKeyPoints xmlns="61b79488-63fd-46f4-b1bf-09cb63d2085e" xsi:nil="true"/>
-  </documentManagement>
-</p:properties>
-</file>
-
-<file path=customXml/item3.xml><?xml version="1.0" encoding="utf-8"?>
 <ct:contentTypeSchema xmlns:ct="http://schemas.microsoft.com/office/2006/metadata/contentType" xmlns:ma="http://schemas.microsoft.com/office/2006/metadata/properties/metaAttributes" ct:_="" ma:_="" ma:contentTypeName="Document" ma:contentTypeID="0x010100F09820594E7B0041BAC4DECBBC892FF9" ma:contentTypeVersion="8" ma:contentTypeDescription="Create a new document." ma:contentTypeScope="" ma:versionID="a4814d1cc1d58eee3ea03778ca413c81">
   <xsd:schema xmlns:xsd="http://www.w3.org/2001/XMLSchema" xmlns:xs="http://www.w3.org/2001/XMLSchema" xmlns:p="http://schemas.microsoft.com/office/2006/metadata/properties" xmlns:ns2="61b79488-63fd-46f4-b1bf-09cb63d2085e" targetNamespace="http://schemas.microsoft.com/office/2006/metadata/properties" ma:root="true" ma:fieldsID="40fb5444c5ccb72d5b900b723022c04a" ns2:_="">
     <xsd:import namespace="61b79488-63fd-46f4-b1bf-09cb63d2085e"/>
@@ -15404,10 +15426,37 @@
 </ct:contentTypeSchema>
 </file>
 
+<file path=customXml/item2.xml><?xml version="1.0" encoding="utf-8"?>
+<p:properties xmlns:p="http://schemas.microsoft.com/office/2006/metadata/properties" xmlns:xsi="http://www.w3.org/2001/XMLSchema-instance" xmlns:pc="http://schemas.microsoft.com/office/infopath/2007/PartnerControls">
+  <documentManagement>
+    <MediaServiceKeyPoints xmlns="61b79488-63fd-46f4-b1bf-09cb63d2085e" xsi:nil="true"/>
+  </documentManagement>
+</p:properties>
+</file>
+
+<file path=customXml/item3.xml><?xml version="1.0" encoding="utf-8"?>
+<?mso-contentType ?>
+<FormTemplates xmlns="http://schemas.microsoft.com/sharepoint/v3/contenttype/forms">
+  <Display>DocumentLibraryForm</Display>
+  <Edit>DocumentLibraryForm</Edit>
+  <New>DocumentLibraryForm</New>
+</FormTemplates>
+</file>
+
 <file path=customXml/itemProps1.xml><?xml version="1.0" encoding="utf-8"?>
-<ds:datastoreItem xmlns:ds="http://schemas.openxmlformats.org/officeDocument/2006/customXml" ds:itemID="{4875BE8C-CB08-400E-A21F-2497FF16C77B}">
+<ds:datastoreItem xmlns:ds="http://schemas.openxmlformats.org/officeDocument/2006/customXml" ds:itemID="{535C360C-FC5A-43F7-BF1D-FA69DEF501D3}">
   <ds:schemaRefs>
-    <ds:schemaRef ds:uri="http://schemas.microsoft.com/sharepoint/v3/contenttype/forms"/>
+    <ds:schemaRef ds:uri="http://schemas.microsoft.com/office/2006/metadata/contentType"/>
+    <ds:schemaRef ds:uri="http://schemas.microsoft.com/office/2006/metadata/properties/metaAttributes"/>
+    <ds:schemaRef ds:uri="http://www.w3.org/2001/XMLSchema"/>
+    <ds:schemaRef ds:uri="http://schemas.microsoft.com/office/2006/metadata/properties"/>
+    <ds:schemaRef ds:uri="61b79488-63fd-46f4-b1bf-09cb63d2085e"/>
+    <ds:schemaRef ds:uri="http://schemas.microsoft.com/office/2006/documentManagement/types"/>
+    <ds:schemaRef ds:uri="http://schemas.microsoft.com/office/infopath/2007/PartnerControls"/>
+    <ds:schemaRef ds:uri="http://schemas.openxmlformats.org/package/2006/metadata/core-properties"/>
+    <ds:schemaRef ds:uri="http://purl.org/dc/elements/1.1/"/>
+    <ds:schemaRef ds:uri="http://purl.org/dc/terms/"/>
+    <ds:schemaRef ds:uri="http://schemas.microsoft.com/internal/obd"/>
   </ds:schemaRefs>
 </ds:datastoreItem>
 </file>
@@ -15429,19 +15478,9 @@
 </file>
 
 <file path=customXml/itemProps3.xml><?xml version="1.0" encoding="utf-8"?>
-<ds:datastoreItem xmlns:ds="http://schemas.openxmlformats.org/officeDocument/2006/customXml" ds:itemID="{535C360C-FC5A-43F7-BF1D-FA69DEF501D3}">
+<ds:datastoreItem xmlns:ds="http://schemas.openxmlformats.org/officeDocument/2006/customXml" ds:itemID="{4875BE8C-CB08-400E-A21F-2497FF16C77B}">
   <ds:schemaRefs>
-    <ds:schemaRef ds:uri="http://schemas.microsoft.com/office/2006/metadata/contentType"/>
-    <ds:schemaRef ds:uri="http://schemas.microsoft.com/office/2006/metadata/properties/metaAttributes"/>
-    <ds:schemaRef ds:uri="http://www.w3.org/2001/XMLSchema"/>
-    <ds:schemaRef ds:uri="http://schemas.microsoft.com/office/2006/metadata/properties"/>
-    <ds:schemaRef ds:uri="61b79488-63fd-46f4-b1bf-09cb63d2085e"/>
-    <ds:schemaRef ds:uri="http://schemas.microsoft.com/office/2006/documentManagement/types"/>
-    <ds:schemaRef ds:uri="http://schemas.microsoft.com/office/infopath/2007/PartnerControls"/>
-    <ds:schemaRef ds:uri="http://schemas.openxmlformats.org/package/2006/metadata/core-properties"/>
-    <ds:schemaRef ds:uri="http://purl.org/dc/elements/1.1/"/>
-    <ds:schemaRef ds:uri="http://purl.org/dc/terms/"/>
-    <ds:schemaRef ds:uri="http://schemas.microsoft.com/internal/obd"/>
+    <ds:schemaRef ds:uri="http://schemas.microsoft.com/sharepoint/v3/contenttype/forms"/>
   </ds:schemaRefs>
 </ds:datastoreItem>
 </file>

</xml_diff>